<commit_message>
end of 2024 update
</commit_message>
<xml_diff>
--- a/downloadables/other/Estate planning/Estate Planning Meeting Slides.pptx
+++ b/downloadables/other/Estate planning/Estate Planning Meeting Slides.pptx
@@ -5,7 +5,7 @@
     <p:sldMasterId id="2147483840" r:id="rId1"/>
   </p:sldMasterIdLst>
   <p:notesMasterIdLst>
-    <p:notesMasterId r:id="rId56"/>
+    <p:notesMasterId r:id="rId59"/>
   </p:notesMasterIdLst>
   <p:sldIdLst>
     <p:sldId id="256" r:id="rId2"/>
@@ -28,40 +28,43 @@
     <p:sldId id="289" r:id="rId19"/>
     <p:sldId id="290" r:id="rId20"/>
     <p:sldId id="291" r:id="rId21"/>
-    <p:sldId id="292" r:id="rId22"/>
-    <p:sldId id="293" r:id="rId23"/>
-    <p:sldId id="294" r:id="rId24"/>
-    <p:sldId id="295" r:id="rId25"/>
-    <p:sldId id="296" r:id="rId26"/>
-    <p:sldId id="297" r:id="rId27"/>
-    <p:sldId id="298" r:id="rId28"/>
-    <p:sldId id="299" r:id="rId29"/>
-    <p:sldId id="300" r:id="rId30"/>
-    <p:sldId id="301" r:id="rId31"/>
-    <p:sldId id="302" r:id="rId32"/>
-    <p:sldId id="305" r:id="rId33"/>
-    <p:sldId id="303" r:id="rId34"/>
-    <p:sldId id="308" r:id="rId35"/>
-    <p:sldId id="306" r:id="rId36"/>
-    <p:sldId id="307" r:id="rId37"/>
-    <p:sldId id="309" r:id="rId38"/>
-    <p:sldId id="310" r:id="rId39"/>
-    <p:sldId id="312" r:id="rId40"/>
-    <p:sldId id="313" r:id="rId41"/>
-    <p:sldId id="314" r:id="rId42"/>
-    <p:sldId id="325" r:id="rId43"/>
-    <p:sldId id="315" r:id="rId44"/>
-    <p:sldId id="316" r:id="rId45"/>
-    <p:sldId id="311" r:id="rId46"/>
-    <p:sldId id="317" r:id="rId47"/>
-    <p:sldId id="318" r:id="rId48"/>
-    <p:sldId id="319" r:id="rId49"/>
-    <p:sldId id="320" r:id="rId50"/>
-    <p:sldId id="327" r:id="rId51"/>
-    <p:sldId id="321" r:id="rId52"/>
-    <p:sldId id="322" r:id="rId53"/>
-    <p:sldId id="323" r:id="rId54"/>
-    <p:sldId id="259" r:id="rId55"/>
+    <p:sldId id="332" r:id="rId22"/>
+    <p:sldId id="331" r:id="rId23"/>
+    <p:sldId id="292" r:id="rId24"/>
+    <p:sldId id="293" r:id="rId25"/>
+    <p:sldId id="294" r:id="rId26"/>
+    <p:sldId id="295" r:id="rId27"/>
+    <p:sldId id="296" r:id="rId28"/>
+    <p:sldId id="297" r:id="rId29"/>
+    <p:sldId id="298" r:id="rId30"/>
+    <p:sldId id="299" r:id="rId31"/>
+    <p:sldId id="300" r:id="rId32"/>
+    <p:sldId id="301" r:id="rId33"/>
+    <p:sldId id="302" r:id="rId34"/>
+    <p:sldId id="333" r:id="rId35"/>
+    <p:sldId id="305" r:id="rId36"/>
+    <p:sldId id="303" r:id="rId37"/>
+    <p:sldId id="308" r:id="rId38"/>
+    <p:sldId id="306" r:id="rId39"/>
+    <p:sldId id="307" r:id="rId40"/>
+    <p:sldId id="309" r:id="rId41"/>
+    <p:sldId id="310" r:id="rId42"/>
+    <p:sldId id="312" r:id="rId43"/>
+    <p:sldId id="313" r:id="rId44"/>
+    <p:sldId id="314" r:id="rId45"/>
+    <p:sldId id="325" r:id="rId46"/>
+    <p:sldId id="315" r:id="rId47"/>
+    <p:sldId id="316" r:id="rId48"/>
+    <p:sldId id="311" r:id="rId49"/>
+    <p:sldId id="317" r:id="rId50"/>
+    <p:sldId id="318" r:id="rId51"/>
+    <p:sldId id="319" r:id="rId52"/>
+    <p:sldId id="320" r:id="rId53"/>
+    <p:sldId id="327" r:id="rId54"/>
+    <p:sldId id="321" r:id="rId55"/>
+    <p:sldId id="322" r:id="rId56"/>
+    <p:sldId id="323" r:id="rId57"/>
+    <p:sldId id="259" r:id="rId58"/>
   </p:sldIdLst>
   <p:sldSz cx="12192000" cy="6858000"/>
   <p:notesSz cx="6858000" cy="9144000"/>
@@ -801,7 +804,7 @@
           <a:p>
             <a:fld id="{7AB30764-2E93-40D4-9536-CEC63B7F7732}" type="datetimeFigureOut">
               <a:rPr lang="en-AU" smtClean="0"/>
-              <a:t>4/05/2022</a:t>
+              <a:t>13/12/2024</a:t>
             </a:fld>
             <a:endParaRPr lang="en-AU"/>
           </a:p>
@@ -1263,7 +1266,7 @@
           <a:p>
             <a:fld id="{726ED139-0480-4198-83E2-68CE0B25BC9B}" type="datetimeFigureOut">
               <a:rPr lang="en-US" dirty="0"/>
-              <a:t>5/4/2022</a:t>
+              <a:t>12/13/2024</a:t>
             </a:fld>
             <a:endParaRPr lang="en-US" dirty="0"/>
           </a:p>
@@ -1429,7 +1432,7 @@
           <a:p>
             <a:fld id="{3A97CE23-3B6A-482C-9BEA-F32A9EB44C40}" type="datetimeFigureOut">
               <a:rPr lang="en-US" dirty="0"/>
-              <a:t>5/4/2022</a:t>
+              <a:t>12/13/2024</a:t>
             </a:fld>
             <a:endParaRPr lang="en-US" dirty="0"/>
           </a:p>
@@ -1645,7 +1648,7 @@
           <a:p>
             <a:fld id="{0639C8FD-9717-4D78-9D01-4CBD0AC8CAE0}" type="datetimeFigureOut">
               <a:rPr lang="en-US" dirty="0"/>
-              <a:t>5/4/2022</a:t>
+              <a:t>12/13/2024</a:t>
             </a:fld>
             <a:endParaRPr lang="en-US" dirty="0"/>
           </a:p>
@@ -1851,7 +1854,7 @@
           <a:p>
             <a:fld id="{B082BD47-5F5E-4508-9DFC-0021F20B392D}" type="datetimeFigureOut">
               <a:rPr lang="en-US" dirty="0"/>
-              <a:t>5/4/2022</a:t>
+              <a:t>12/13/2024</a:t>
             </a:fld>
             <a:endParaRPr lang="en-US" dirty="0"/>
           </a:p>
@@ -2141,7 +2144,7 @@
           <a:p>
             <a:fld id="{07BB23E3-326B-4424-9A50-2CBB9CA4B2E5}" type="datetimeFigureOut">
               <a:rPr lang="en-US" dirty="0"/>
-              <a:t>5/4/2022</a:t>
+              <a:t>12/13/2024</a:t>
             </a:fld>
             <a:endParaRPr lang="en-US" dirty="0"/>
           </a:p>
@@ -2465,7 +2468,7 @@
           <a:p>
             <a:fld id="{FAA09F6F-C437-48B6-80BB-8E50899C06AF}" type="datetimeFigureOut">
               <a:rPr lang="en-US" dirty="0"/>
-              <a:t>5/4/2022</a:t>
+              <a:t>12/13/2024</a:t>
             </a:fld>
             <a:endParaRPr lang="en-US" dirty="0"/>
           </a:p>
@@ -2952,7 +2955,7 @@
           <a:p>
             <a:fld id="{1A776D14-B85F-4865-804C-5734F9C85CDD}" type="datetimeFigureOut">
               <a:rPr lang="en-US" dirty="0"/>
-              <a:t>5/4/2022</a:t>
+              <a:t>12/13/2024</a:t>
             </a:fld>
             <a:endParaRPr lang="en-US" dirty="0"/>
           </a:p>
@@ -3106,7 +3109,7 @@
           <a:p>
             <a:fld id="{A8956C38-6601-4688-9146-5E61D8B04598}" type="datetimeFigureOut">
               <a:rPr lang="en-US" dirty="0"/>
-              <a:t>5/4/2022</a:t>
+              <a:t>12/13/2024</a:t>
             </a:fld>
             <a:endParaRPr lang="en-US" dirty="0"/>
           </a:p>
@@ -3237,7 +3240,7 @@
           <a:p>
             <a:fld id="{3046061E-CDAE-49E3-92CB-288B639C3B6F}" type="datetimeFigureOut">
               <a:rPr lang="en-US" dirty="0"/>
-              <a:t>5/4/2022</a:t>
+              <a:t>12/13/2024</a:t>
             </a:fld>
             <a:endParaRPr lang="en-US" dirty="0"/>
           </a:p>
@@ -3560,7 +3563,7 @@
           <a:p>
             <a:fld id="{A35E9851-4767-4B63-B36B-F772D06043F2}" type="datetimeFigureOut">
               <a:rPr lang="en-US" dirty="0"/>
-              <a:t>5/4/2022</a:t>
+              <a:t>12/13/2024</a:t>
             </a:fld>
             <a:endParaRPr lang="en-US" dirty="0"/>
           </a:p>
@@ -3870,7 +3873,7 @@
           <a:p>
             <a:fld id="{7309A586-BE94-448D-BAE3-D5D323B9149F}" type="datetimeFigureOut">
               <a:rPr lang="en-US" dirty="0"/>
-              <a:t>5/4/2022</a:t>
+              <a:t>12/13/2024</a:t>
             </a:fld>
             <a:endParaRPr lang="en-US" dirty="0"/>
           </a:p>
@@ -4117,7 +4120,7 @@
           <a:p>
             <a:fld id="{ADDEAF24-54CC-4408-99B3-A70A172EFF44}" type="datetimeFigureOut">
               <a:rPr lang="en-US" dirty="0"/>
-              <a:t>5/4/2022</a:t>
+              <a:t>12/13/2024</a:t>
             </a:fld>
             <a:endParaRPr lang="en-US" dirty="0"/>
           </a:p>
@@ -6927,7 +6930,7 @@
         </p:spPr>
         <p:txBody>
           <a:bodyPr>
-            <a:normAutofit fontScale="92500" lnSpcReduction="10000"/>
+            <a:normAutofit/>
           </a:bodyPr>
           <a:lstStyle/>
           <a:p>
@@ -6962,31 +6965,44 @@
             <a:pPr lvl="0"/>
             <a:r>
               <a:rPr lang="en-US" dirty="0"/>
-              <a:t>Pension over $1.6 million?</a:t>
-            </a:r>
-          </a:p>
-          <a:p>
-            <a:pPr lvl="0"/>
-            <a:r>
-              <a:rPr lang="en-US" dirty="0"/>
-              <a:t>SMSF – a lawyer should do it for you to review any governing documents and follow the procedure and consider the control mechanisms</a:t>
-            </a:r>
-          </a:p>
-          <a:p>
-            <a:pPr lvl="0"/>
-            <a:r>
-              <a:rPr lang="en-US" dirty="0"/>
-              <a:t>If SMSF – story time</a:t>
-            </a:r>
-          </a:p>
-          <a:p>
-            <a:pPr marL="63500" lvl="0" indent="0">
-              <a:buNone/>
-            </a:pPr>
-            <a:r>
-              <a:rPr lang="en-US" dirty="0"/>
-              <a:t>To avoid all doubt, you should consider preparing a nomination to confirm what happens to your superannuation benefits.  If you make this nomination binding, there is no room for ambiguity or dispute.</a:t>
-            </a:r>
+              <a:t>To estate or directly to individual – best depends on</a:t>
+            </a:r>
+          </a:p>
+          <a:p>
+            <a:pPr lvl="1"/>
+            <a:r>
+              <a:rPr lang="en-US" dirty="0"/>
+              <a:t>Tax (we cannot give financial advice)</a:t>
+            </a:r>
+          </a:p>
+          <a:p>
+            <a:pPr lvl="1"/>
+            <a:r>
+              <a:rPr lang="en-US" dirty="0"/>
+              <a:t>Timing to receive payment/need to receive payment (estate pay out longer)</a:t>
+            </a:r>
+          </a:p>
+          <a:p>
+            <a:pPr lvl="1"/>
+            <a:r>
+              <a:rPr lang="en-US" dirty="0"/>
+              <a:t>Estate planning intentions</a:t>
+            </a:r>
+          </a:p>
+          <a:p>
+            <a:pPr lvl="0"/>
+            <a:r>
+              <a:rPr lang="en-US" dirty="0"/>
+              <a:t>Pension over $1.9 million?</a:t>
+            </a:r>
+          </a:p>
+          <a:p>
+            <a:pPr lvl="0"/>
+            <a:endParaRPr lang="en-US" dirty="0"/>
+          </a:p>
+          <a:p>
+            <a:pPr lvl="0"/>
+            <a:endParaRPr lang="en-US" dirty="0"/>
           </a:p>
           <a:p>
             <a:endParaRPr lang="en-AU" dirty="0"/>
@@ -7011,7 +7027,13 @@
   <p:cSld>
     <p:spTree>
       <p:nvGrpSpPr>
-        <p:cNvPr id="1" name=""/>
+        <p:cNvPr id="1" name="">
+          <a:extLst>
+            <a:ext uri="{FF2B5EF4-FFF2-40B4-BE49-F238E27FC236}">
+              <a16:creationId xmlns:a16="http://schemas.microsoft.com/office/drawing/2014/main" id="{E9D4BDE4-A1A7-113E-0EA0-0264BAC2E644}"/>
+            </a:ext>
+          </a:extLst>
+        </p:cNvPr>
         <p:cNvGrpSpPr/>
         <p:nvPr/>
       </p:nvGrpSpPr>
@@ -7028,7 +7050,7 @@
           <p:cNvPr id="2" name="Title 1">
             <a:extLst>
               <a:ext uri="{FF2B5EF4-FFF2-40B4-BE49-F238E27FC236}">
-                <a16:creationId xmlns:a16="http://schemas.microsoft.com/office/drawing/2014/main" id="{7F5CD355-0B6A-4ED3-93F5-802B5D5D5AE6}"/>
+                <a16:creationId xmlns:a16="http://schemas.microsoft.com/office/drawing/2014/main" id="{D7FD854D-F03B-6A68-E1E3-23A6AA3C9C7D}"/>
               </a:ext>
             </a:extLst>
           </p:cNvPr>
@@ -7046,7 +7068,7 @@
           <a:p>
             <a:r>
               <a:rPr lang="en-AU" dirty="0"/>
-              <a:t>Jointly held assets</a:t>
+              <a:t>Superannuation</a:t>
             </a:r>
           </a:p>
         </p:txBody>
@@ -7056,7 +7078,7 @@
           <p:cNvPr id="3" name="Content Placeholder 2">
             <a:extLst>
               <a:ext uri="{FF2B5EF4-FFF2-40B4-BE49-F238E27FC236}">
-                <a16:creationId xmlns:a16="http://schemas.microsoft.com/office/drawing/2014/main" id="{8F87A3BB-4F12-4FEB-B7D2-BA2CC372E9C6}"/>
+                <a16:creationId xmlns:a16="http://schemas.microsoft.com/office/drawing/2014/main" id="{EBBA5863-FA39-BBE7-7DBD-EB22FA458061}"/>
               </a:ext>
             </a:extLst>
           </p:cNvPr>
@@ -7075,70 +7097,74 @@
         </p:spPr>
         <p:txBody>
           <a:bodyPr>
-            <a:normAutofit fontScale="92500" lnSpcReduction="10000"/>
+            <a:normAutofit/>
           </a:bodyPr>
           <a:lstStyle/>
           <a:p>
-            <a:pPr marL="63500" lvl="0" indent="0">
-              <a:buNone/>
-            </a:pPr>
-            <a:r>
-              <a:rPr lang="en-US" dirty="0"/>
-              <a:t>Joint tenants (think ‘joined by the hips’)</a:t>
-            </a:r>
-          </a:p>
-          <a:p>
-            <a:pPr lvl="0"/>
-            <a:r>
-              <a:rPr lang="en-US" dirty="0"/>
-              <a:t>Rule of survivorship – each person owns 100% (from succession perspective)</a:t>
-            </a:r>
-          </a:p>
-          <a:p>
-            <a:pPr lvl="0"/>
-            <a:r>
-              <a:rPr lang="en-US" dirty="0"/>
-              <a:t>Death of co-owner means surviving co-owner automatically receives asset</a:t>
-            </a:r>
-          </a:p>
-          <a:p>
-            <a:pPr marL="63500" lvl="0" indent="0">
-              <a:buNone/>
-            </a:pPr>
-            <a:r>
-              <a:rPr lang="en-US" dirty="0"/>
-              <a:t>Tenants in common</a:t>
-            </a:r>
-          </a:p>
-          <a:p>
-            <a:pPr lvl="0"/>
-            <a:r>
-              <a:rPr lang="en-US" dirty="0"/>
-              <a:t>Each co-owner owns a specific percentage in an asset (e.g. 50%, 99%)</a:t>
-            </a:r>
-          </a:p>
-          <a:p>
-            <a:pPr lvl="0"/>
-            <a:r>
-              <a:rPr lang="en-US" dirty="0"/>
-              <a:t>All percentages add up to 100%</a:t>
-            </a:r>
-          </a:p>
-          <a:p>
-            <a:pPr lvl="0"/>
-            <a:r>
-              <a:rPr lang="en-US" dirty="0"/>
-              <a:t>Death of co-owner means that deceased’s share goes into their Will</a:t>
-            </a:r>
-          </a:p>
-          <a:p>
-            <a:pPr marL="63500" lvl="0" indent="0">
-              <a:buNone/>
-            </a:pPr>
-            <a:r>
-              <a:rPr lang="en-US" dirty="0"/>
-              <a:t>It is important to appreciate that assets can be held jointly in different ways.  It also needs to be considered if it is better for any assets you hold jointly with another, to be held in one manner over another.</a:t>
-            </a:r>
+            <a:pPr lvl="0"/>
+            <a:r>
+              <a:rPr lang="en-US" dirty="0"/>
+              <a:t>Superannuation broken into tax free and taxable components</a:t>
+            </a:r>
+          </a:p>
+          <a:p>
+            <a:pPr lvl="0"/>
+            <a:r>
+              <a:rPr lang="en-US" dirty="0"/>
+              <a:t>Spouse, minor children, dependents – receives both components tax free</a:t>
+            </a:r>
+          </a:p>
+          <a:p>
+            <a:pPr lvl="0"/>
+            <a:r>
+              <a:rPr lang="en-US" dirty="0"/>
+              <a:t>Everyone else (including adult independent children) – </a:t>
+            </a:r>
+          </a:p>
+          <a:p>
+            <a:pPr lvl="1"/>
+            <a:r>
+              <a:rPr lang="en-US" dirty="0"/>
+              <a:t>tax free component tax free and </a:t>
+            </a:r>
+          </a:p>
+          <a:p>
+            <a:pPr lvl="1"/>
+            <a:r>
+              <a:rPr lang="en-US" dirty="0"/>
+              <a:t>tax on taxable component:</a:t>
+            </a:r>
+          </a:p>
+          <a:p>
+            <a:pPr lvl="2"/>
+            <a:r>
+              <a:rPr lang="en-US" dirty="0"/>
+              <a:t>15% plus Medicare if received directly</a:t>
+            </a:r>
+          </a:p>
+          <a:p>
+            <a:pPr lvl="2"/>
+            <a:r>
+              <a:rPr lang="en-US" dirty="0"/>
+              <a:t>15% if paid via estate</a:t>
+            </a:r>
+          </a:p>
+          <a:p>
+            <a:pPr lvl="2"/>
+            <a:r>
+              <a:rPr lang="en-US" dirty="0"/>
+              <a:t>30% in certain circumstances</a:t>
+            </a:r>
+          </a:p>
+          <a:p>
+            <a:r>
+              <a:rPr lang="en-US" dirty="0"/>
+              <a:t>If paid to estate, then whether taxed will depend on who benefits from death benefits paid into Will (look through approach)</a:t>
+            </a:r>
+          </a:p>
+          <a:p>
+            <a:pPr lvl="0"/>
+            <a:endParaRPr lang="en-US" dirty="0"/>
           </a:p>
           <a:p>
             <a:endParaRPr lang="en-AU" dirty="0"/>
@@ -7148,7 +7174,7 @@
     </p:spTree>
     <p:extLst>
       <p:ext uri="{BB962C8B-B14F-4D97-AF65-F5344CB8AC3E}">
-        <p14:creationId xmlns:p14="http://schemas.microsoft.com/office/powerpoint/2010/main" val="439989241"/>
+        <p14:creationId xmlns:p14="http://schemas.microsoft.com/office/powerpoint/2010/main" val="872682587"/>
       </p:ext>
     </p:extLst>
   </p:cSld>
@@ -7163,7 +7189,13 @@
   <p:cSld>
     <p:spTree>
       <p:nvGrpSpPr>
-        <p:cNvPr id="1" name=""/>
+        <p:cNvPr id="1" name="">
+          <a:extLst>
+            <a:ext uri="{FF2B5EF4-FFF2-40B4-BE49-F238E27FC236}">
+              <a16:creationId xmlns:a16="http://schemas.microsoft.com/office/drawing/2014/main" id="{8627ADC9-27FF-F44E-22A9-4AD79CD69571}"/>
+            </a:ext>
+          </a:extLst>
+        </p:cNvPr>
         <p:cNvGrpSpPr/>
         <p:nvPr/>
       </p:nvGrpSpPr>
@@ -7180,7 +7212,7 @@
           <p:cNvPr id="2" name="Title 1">
             <a:extLst>
               <a:ext uri="{FF2B5EF4-FFF2-40B4-BE49-F238E27FC236}">
-                <a16:creationId xmlns:a16="http://schemas.microsoft.com/office/drawing/2014/main" id="{7F5CD355-0B6A-4ED3-93F5-802B5D5D5AE6}"/>
+                <a16:creationId xmlns:a16="http://schemas.microsoft.com/office/drawing/2014/main" id="{191961B0-7F8B-88BE-E21F-FFDF908B544D}"/>
               </a:ext>
             </a:extLst>
           </p:cNvPr>
@@ -7198,7 +7230,7 @@
           <a:p>
             <a:r>
               <a:rPr lang="en-AU" dirty="0"/>
-              <a:t>Trust assets</a:t>
+              <a:t>Self-managed superannuation</a:t>
             </a:r>
           </a:p>
         </p:txBody>
@@ -7208,7 +7240,7 @@
           <p:cNvPr id="3" name="Content Placeholder 2">
             <a:extLst>
               <a:ext uri="{FF2B5EF4-FFF2-40B4-BE49-F238E27FC236}">
-                <a16:creationId xmlns:a16="http://schemas.microsoft.com/office/drawing/2014/main" id="{8F87A3BB-4F12-4FEB-B7D2-BA2CC372E9C6}"/>
+                <a16:creationId xmlns:a16="http://schemas.microsoft.com/office/drawing/2014/main" id="{8ECC0111-30E6-5DE0-4095-9FF2A0AB8881}"/>
               </a:ext>
             </a:extLst>
           </p:cNvPr>
@@ -7234,42 +7266,14 @@
             <a:pPr lvl="0"/>
             <a:r>
               <a:rPr lang="en-US" dirty="0"/>
-              <a:t>Assets in a trust is not yours</a:t>
-            </a:r>
-          </a:p>
-          <a:p>
-            <a:pPr lvl="0"/>
-            <a:r>
-              <a:rPr lang="en-US" dirty="0"/>
-              <a:t>There is a document (trust deed) governing the rules of the ‘trust’</a:t>
-            </a:r>
-          </a:p>
-          <a:p>
-            <a:pPr lvl="0"/>
-            <a:r>
-              <a:rPr lang="en-US" dirty="0"/>
-              <a:t>Those rules dictate who can benefit – it is not for your Will to override those rules by default</a:t>
-            </a:r>
-          </a:p>
-          <a:p>
-            <a:pPr lvl="0"/>
-            <a:r>
-              <a:rPr lang="en-US" dirty="0"/>
-              <a:t>Question becomes who controls the trust</a:t>
-            </a:r>
-          </a:p>
-          <a:p>
-            <a:pPr lvl="0"/>
-            <a:r>
-              <a:rPr lang="en-US" dirty="0"/>
-              <a:t>As there is already a set rule book, if your intentions are contrary to the rule book, complicated changes need to be made</a:t>
-            </a:r>
-          </a:p>
-          <a:p>
-            <a:pPr lvl="0"/>
-            <a:r>
-              <a:rPr lang="en-US" dirty="0"/>
-              <a:t>The rule book needs to be reviewed</a:t>
+              <a:t>SMSF – a lawyer should do it for you to review any governing documents and follow the procedure and consider the control mechanisms</a:t>
+            </a:r>
+          </a:p>
+          <a:p>
+            <a:pPr lvl="0"/>
+            <a:r>
+              <a:rPr lang="en-US" dirty="0"/>
+              <a:t>If SMSF – story time</a:t>
             </a:r>
           </a:p>
           <a:p>
@@ -7278,7 +7282,7 @@
             </a:pPr>
             <a:r>
               <a:rPr lang="en-US" dirty="0"/>
-              <a:t>Assets held in trusts normally pass through the ‘gifting’ of control.  By giving control to the relevant person(s), that person(s) can decide how to deal with the assets in the trust.</a:t>
+              <a:t>To avoid all doubt, you should consider preparing a nomination to confirm what happens to your superannuation benefits.  If you make this nomination binding, there is no room for ambiguity or dispute.</a:t>
             </a:r>
           </a:p>
           <a:p>
@@ -7289,7 +7293,7 @@
     </p:spTree>
     <p:extLst>
       <p:ext uri="{BB962C8B-B14F-4D97-AF65-F5344CB8AC3E}">
-        <p14:creationId xmlns:p14="http://schemas.microsoft.com/office/powerpoint/2010/main" val="183092223"/>
+        <p14:creationId xmlns:p14="http://schemas.microsoft.com/office/powerpoint/2010/main" val="3591436635"/>
       </p:ext>
     </p:extLst>
   </p:cSld>
@@ -7339,7 +7343,7 @@
           <a:p>
             <a:r>
               <a:rPr lang="en-AU" dirty="0"/>
-              <a:t>Company assets</a:t>
+              <a:t>Jointly held assets</a:t>
             </a:r>
           </a:p>
         </p:txBody>
@@ -7368,58 +7372,69 @@
         </p:spPr>
         <p:txBody>
           <a:bodyPr>
-            <a:normAutofit lnSpcReduction="10000"/>
+            <a:normAutofit fontScale="92500" lnSpcReduction="10000"/>
           </a:bodyPr>
           <a:lstStyle/>
-          <a:p>
-            <a:pPr lvl="0"/>
-            <a:r>
-              <a:rPr lang="en-US" dirty="0"/>
-              <a:t>Assets in a company is not yours, a company does not pass away with you</a:t>
-            </a:r>
-          </a:p>
-          <a:p>
-            <a:pPr lvl="0"/>
-            <a:r>
-              <a:rPr lang="en-US" dirty="0"/>
-              <a:t>There is a document (constitution) governing the rules of the company</a:t>
-            </a:r>
-          </a:p>
-          <a:p>
-            <a:pPr lvl="0"/>
-            <a:r>
-              <a:rPr lang="en-US" dirty="0"/>
-              <a:t>The directors enforce the rules and makes the decisions</a:t>
-            </a:r>
-          </a:p>
-          <a:p>
-            <a:pPr lvl="0"/>
-            <a:r>
-              <a:rPr lang="en-US" dirty="0"/>
-              <a:t>Shareholders ultimately benefit from any retained assets in the company and can dictate who the directors are</a:t>
-            </a:r>
-          </a:p>
-          <a:p>
-            <a:pPr lvl="0"/>
-            <a:r>
-              <a:rPr lang="en-US" dirty="0"/>
-              <a:t>The rule book for the company, however, needs to be reviewed to see if it states what happens</a:t>
-            </a:r>
-          </a:p>
-          <a:p>
-            <a:pPr lvl="0"/>
-            <a:r>
-              <a:rPr lang="en-US" dirty="0"/>
-              <a:t>If there are multiple shareholders, then any ‘shareholders agreement’ also needs to be considered</a:t>
-            </a:r>
-          </a:p>
           <a:p>
             <a:pPr marL="63500" lvl="0" indent="0">
               <a:buNone/>
             </a:pPr>
             <a:r>
               <a:rPr lang="en-US" dirty="0"/>
-              <a:t>Assets in a company stays in the company if you pass away.  The question, however, is who becomes the shareholder for the company.</a:t>
+              <a:t>Joint tenants (think ‘joined by the hips’)</a:t>
+            </a:r>
+          </a:p>
+          <a:p>
+            <a:pPr lvl="0"/>
+            <a:r>
+              <a:rPr lang="en-US" dirty="0"/>
+              <a:t>Rule of survivorship – each person owns 100% (from succession perspective)</a:t>
+            </a:r>
+          </a:p>
+          <a:p>
+            <a:pPr lvl="0"/>
+            <a:r>
+              <a:rPr lang="en-US" dirty="0"/>
+              <a:t>Death of co-owner means surviving co-owner automatically receives asset</a:t>
+            </a:r>
+          </a:p>
+          <a:p>
+            <a:pPr marL="63500" lvl="0" indent="0">
+              <a:buNone/>
+            </a:pPr>
+            <a:r>
+              <a:rPr lang="en-US" dirty="0"/>
+              <a:t>Tenants in common</a:t>
+            </a:r>
+          </a:p>
+          <a:p>
+            <a:pPr lvl="0"/>
+            <a:r>
+              <a:rPr lang="en-US" dirty="0"/>
+              <a:t>Each co-owner owns a specific percentage in an asset (e.g. 50%, 99%)</a:t>
+            </a:r>
+          </a:p>
+          <a:p>
+            <a:pPr lvl="0"/>
+            <a:r>
+              <a:rPr lang="en-US" dirty="0"/>
+              <a:t>All percentages add up to 100%</a:t>
+            </a:r>
+          </a:p>
+          <a:p>
+            <a:pPr lvl="0"/>
+            <a:r>
+              <a:rPr lang="en-US" dirty="0"/>
+              <a:t>Death of co-owner means that deceased’s share goes into their Will</a:t>
+            </a:r>
+          </a:p>
+          <a:p>
+            <a:pPr marL="63500" lvl="0" indent="0">
+              <a:buNone/>
+            </a:pPr>
+            <a:r>
+              <a:rPr lang="en-US" dirty="0"/>
+              <a:t>It is important to appreciate that assets can be held jointly in different ways.  It also needs to be considered if it is better for any assets you hold jointly with another, to be held in one manner over another.</a:t>
             </a:r>
           </a:p>
           <a:p>
@@ -7430,7 +7445,7 @@
     </p:spTree>
     <p:extLst>
       <p:ext uri="{BB962C8B-B14F-4D97-AF65-F5344CB8AC3E}">
-        <p14:creationId xmlns:p14="http://schemas.microsoft.com/office/powerpoint/2010/main" val="4275801098"/>
+        <p14:creationId xmlns:p14="http://schemas.microsoft.com/office/powerpoint/2010/main" val="439989241"/>
       </p:ext>
     </p:extLst>
   </p:cSld>
@@ -7480,7 +7495,7 @@
           <a:p>
             <a:r>
               <a:rPr lang="en-AU" dirty="0"/>
-              <a:t>Business and partnership assets</a:t>
+              <a:t>Trust assets</a:t>
             </a:r>
           </a:p>
         </p:txBody>
@@ -7516,28 +7531,42 @@
             <a:pPr lvl="0"/>
             <a:r>
               <a:rPr lang="en-US" dirty="0"/>
-              <a:t>Depending on the different ways you own assets in a business or partnership, you will need to consider those relevant estate planning issues</a:t>
-            </a:r>
-          </a:p>
-          <a:p>
-            <a:pPr lvl="0"/>
-            <a:r>
-              <a:rPr lang="en-US" dirty="0"/>
-              <a:t>Also, however, given you are dealing with other persons, you should consider what happens if a key person passes away.</a:t>
-            </a:r>
-          </a:p>
-          <a:p>
-            <a:pPr lvl="0"/>
-            <a:r>
-              <a:rPr lang="en-US" dirty="0"/>
-              <a:t>To respect your partner/s, they should also be part of the discussion and all in agreeance.</a:t>
-            </a:r>
-          </a:p>
-          <a:p>
-            <a:pPr lvl="0"/>
-            <a:r>
-              <a:rPr lang="en-US" dirty="0"/>
-              <a:t>Additional documents will be required (shareholders/unitholders agreements, partnership deeds and/or buy sell deeds)</a:t>
+              <a:t>Assets in a trust is not yours</a:t>
+            </a:r>
+          </a:p>
+          <a:p>
+            <a:pPr lvl="0"/>
+            <a:r>
+              <a:rPr lang="en-US" dirty="0"/>
+              <a:t>There is a document (trust deed) governing the rules of the ‘trust’</a:t>
+            </a:r>
+          </a:p>
+          <a:p>
+            <a:pPr lvl="0"/>
+            <a:r>
+              <a:rPr lang="en-US" dirty="0"/>
+              <a:t>Those rules dictate who can benefit – it is not for your Will to override those rules by default</a:t>
+            </a:r>
+          </a:p>
+          <a:p>
+            <a:pPr lvl="0"/>
+            <a:r>
+              <a:rPr lang="en-US" dirty="0"/>
+              <a:t>Question becomes who controls the trust</a:t>
+            </a:r>
+          </a:p>
+          <a:p>
+            <a:pPr lvl="0"/>
+            <a:r>
+              <a:rPr lang="en-US" dirty="0"/>
+              <a:t>As there is already a set rule book, if your intentions are contrary to the rule book, complicated changes need to be made</a:t>
+            </a:r>
+          </a:p>
+          <a:p>
+            <a:pPr lvl="0"/>
+            <a:r>
+              <a:rPr lang="en-US" dirty="0"/>
+              <a:t>The rule book needs to be reviewed</a:t>
             </a:r>
           </a:p>
           <a:p>
@@ -7546,7 +7575,7 @@
             </a:pPr>
             <a:r>
               <a:rPr lang="en-US" dirty="0"/>
-              <a:t>As there are multiple ‘unrelated’ persons involved, any discussion in relation to the succession should be discussed with all parties.</a:t>
+              <a:t>Assets held in trusts normally pass through the ‘gifting’ of control.  By giving control to the relevant person(s), that person(s) can decide how to deal with the assets in the trust.</a:t>
             </a:r>
           </a:p>
           <a:p>
@@ -7557,7 +7586,7 @@
     </p:spTree>
     <p:extLst>
       <p:ext uri="{BB962C8B-B14F-4D97-AF65-F5344CB8AC3E}">
-        <p14:creationId xmlns:p14="http://schemas.microsoft.com/office/powerpoint/2010/main" val="1271371018"/>
+        <p14:creationId xmlns:p14="http://schemas.microsoft.com/office/powerpoint/2010/main" val="183092223"/>
       </p:ext>
     </p:extLst>
   </p:cSld>
@@ -7607,7 +7636,7 @@
           <a:p>
             <a:r>
               <a:rPr lang="en-AU" dirty="0"/>
-              <a:t>Overseas assets/beneficiaries</a:t>
+              <a:t>Company assets</a:t>
             </a:r>
           </a:p>
         </p:txBody>
@@ -7636,28 +7665,58 @@
         </p:spPr>
         <p:txBody>
           <a:bodyPr>
-            <a:normAutofit/>
+            <a:normAutofit lnSpcReduction="10000"/>
           </a:bodyPr>
           <a:lstStyle/>
           <a:p>
             <a:pPr lvl="0"/>
             <a:r>
               <a:rPr lang="en-US" dirty="0"/>
-              <a:t>Get a Will in that Country!</a:t>
-            </a:r>
-          </a:p>
-          <a:p>
-            <a:pPr lvl="0"/>
-            <a:r>
-              <a:rPr lang="en-US" dirty="0"/>
-              <a:t>Consider tax issues if there are overseas beneficiaries (CGT event K3)</a:t>
-            </a:r>
-          </a:p>
-          <a:p>
-            <a:pPr lvl="0"/>
-            <a:r>
-              <a:rPr lang="en-US" dirty="0"/>
-              <a:t>FIRB and other surcharges for ‘foreigners’</a:t>
+              <a:t>Assets in a company is not yours, a company does not pass away with you</a:t>
+            </a:r>
+          </a:p>
+          <a:p>
+            <a:pPr lvl="0"/>
+            <a:r>
+              <a:rPr lang="en-US" dirty="0"/>
+              <a:t>There is a document (constitution) governing the rules of the company</a:t>
+            </a:r>
+          </a:p>
+          <a:p>
+            <a:pPr lvl="0"/>
+            <a:r>
+              <a:rPr lang="en-US" dirty="0"/>
+              <a:t>The directors enforce the rules and makes the decisions</a:t>
+            </a:r>
+          </a:p>
+          <a:p>
+            <a:pPr lvl="0"/>
+            <a:r>
+              <a:rPr lang="en-US" dirty="0"/>
+              <a:t>Shareholders ultimately benefit from any retained assets in the company and can dictate who the directors are</a:t>
+            </a:r>
+          </a:p>
+          <a:p>
+            <a:pPr lvl="0"/>
+            <a:r>
+              <a:rPr lang="en-US" dirty="0"/>
+              <a:t>The rule book for the company, however, needs to be reviewed to see if it states what happens</a:t>
+            </a:r>
+          </a:p>
+          <a:p>
+            <a:pPr lvl="0"/>
+            <a:r>
+              <a:rPr lang="en-US" dirty="0"/>
+              <a:t>If there are multiple shareholders, then any ‘shareholders agreement’ also needs to be considered</a:t>
+            </a:r>
+          </a:p>
+          <a:p>
+            <a:pPr marL="63500" lvl="0" indent="0">
+              <a:buNone/>
+            </a:pPr>
+            <a:r>
+              <a:rPr lang="en-US" dirty="0"/>
+              <a:t>Assets in a company stays in the company if you pass away.  The question, however, is who becomes the shareholder for the company.</a:t>
             </a:r>
           </a:p>
           <a:p>
@@ -7668,7 +7727,7 @@
     </p:spTree>
     <p:extLst>
       <p:ext uri="{BB962C8B-B14F-4D97-AF65-F5344CB8AC3E}">
-        <p14:creationId xmlns:p14="http://schemas.microsoft.com/office/powerpoint/2010/main" val="893777579"/>
+        <p14:creationId xmlns:p14="http://schemas.microsoft.com/office/powerpoint/2010/main" val="4275801098"/>
       </p:ext>
     </p:extLst>
   </p:cSld>
@@ -7718,7 +7777,7 @@
           <a:p>
             <a:r>
               <a:rPr lang="en-AU" dirty="0"/>
-              <a:t>Other issues</a:t>
+              <a:t>Business and partnership assets</a:t>
             </a:r>
           </a:p>
         </p:txBody>
@@ -7754,69 +7813,40 @@
             <a:pPr lvl="0"/>
             <a:r>
               <a:rPr lang="en-US" dirty="0"/>
-              <a:t>Funeral arrangements (recommended in memo of directions)</a:t>
-            </a:r>
-          </a:p>
-          <a:p>
-            <a:pPr lvl="0"/>
-            <a:r>
-              <a:rPr lang="en-US" dirty="0"/>
-              <a:t>Digital assets (pass under Will or license only)</a:t>
-            </a:r>
-          </a:p>
-          <a:p>
-            <a:pPr lvl="0"/>
-            <a:r>
-              <a:rPr lang="en-US" dirty="0"/>
-              <a:t>Intellectual property (including artwork, music etc.)</a:t>
-            </a:r>
-          </a:p>
-          <a:p>
-            <a:pPr lvl="0"/>
-            <a:r>
-              <a:rPr lang="en-US" dirty="0"/>
-              <a:t>Cryptocurrencies</a:t>
-            </a:r>
-          </a:p>
-          <a:p>
-            <a:pPr lvl="0"/>
-            <a:r>
-              <a:rPr lang="en-US" dirty="0"/>
-              <a:t>Loan accounts</a:t>
-            </a:r>
-          </a:p>
-          <a:p>
-            <a:pPr lvl="0"/>
-            <a:r>
-              <a:rPr lang="en-US" dirty="0"/>
-              <a:t>Liabilities and personal guarantees</a:t>
-            </a:r>
-          </a:p>
-          <a:p>
-            <a:pPr lvl="0"/>
-            <a:r>
-              <a:rPr lang="en-US" dirty="0"/>
-              <a:t>Life interests</a:t>
-            </a:r>
-          </a:p>
-          <a:p>
-            <a:pPr lvl="0"/>
-            <a:r>
-              <a:rPr lang="en-US" dirty="0"/>
-              <a:t>Binding financial agreements</a:t>
-            </a:r>
-          </a:p>
-          <a:p>
-            <a:pPr lvl="0"/>
-            <a:r>
-              <a:rPr lang="en-US" dirty="0"/>
-              <a:t>Other agreements</a:t>
-            </a:r>
-          </a:p>
-          <a:p>
-            <a:pPr marL="0" indent="0">
+              <a:t>Depending on the different ways you own assets in a business or partnership, you will need to consider those relevant estate planning issues</a:t>
+            </a:r>
+          </a:p>
+          <a:p>
+            <a:pPr lvl="0"/>
+            <a:r>
+              <a:rPr lang="en-US" dirty="0"/>
+              <a:t>Also, however, given you are dealing with other persons, you should consider what happens if a key person passes away.</a:t>
+            </a:r>
+          </a:p>
+          <a:p>
+            <a:pPr lvl="0"/>
+            <a:r>
+              <a:rPr lang="en-US" dirty="0"/>
+              <a:t>To respect your partner/s, they should also be part of the discussion and all in agreeance.</a:t>
+            </a:r>
+          </a:p>
+          <a:p>
+            <a:pPr lvl="0"/>
+            <a:r>
+              <a:rPr lang="en-US" dirty="0"/>
+              <a:t>Additional documents will be required (shareholders/unitholders agreements, partnership deeds and/or buy sell deeds)</a:t>
+            </a:r>
+          </a:p>
+          <a:p>
+            <a:pPr marL="63500" lvl="0" indent="0">
               <a:buNone/>
             </a:pPr>
+            <a:r>
+              <a:rPr lang="en-US" dirty="0"/>
+              <a:t>As there are multiple ‘unrelated’ persons involved, any discussion in relation to the succession should be discussed with all parties.</a:t>
+            </a:r>
+          </a:p>
+          <a:p>
             <a:endParaRPr lang="en-AU" dirty="0"/>
           </a:p>
         </p:txBody>
@@ -7824,7 +7854,7 @@
     </p:spTree>
     <p:extLst>
       <p:ext uri="{BB962C8B-B14F-4D97-AF65-F5344CB8AC3E}">
-        <p14:creationId xmlns:p14="http://schemas.microsoft.com/office/powerpoint/2010/main" val="4113091626"/>
+        <p14:creationId xmlns:p14="http://schemas.microsoft.com/office/powerpoint/2010/main" val="1271371018"/>
       </p:ext>
     </p:extLst>
   </p:cSld>
@@ -7874,7 +7904,7 @@
           <a:p>
             <a:r>
               <a:rPr lang="en-AU" dirty="0"/>
-              <a:t>Flexibility</a:t>
+              <a:t>Overseas assets/beneficiaries</a:t>
             </a:r>
           </a:p>
         </p:txBody>
@@ -7910,58 +7940,21 @@
             <a:pPr lvl="0"/>
             <a:r>
               <a:rPr lang="en-US" dirty="0"/>
-              <a:t>How flexible do you want to leave things?</a:t>
-            </a:r>
-          </a:p>
-          <a:p>
-            <a:pPr lvl="0"/>
-            <a:r>
-              <a:rPr lang="en-US" dirty="0"/>
-              <a:t>The more ‘set in stone’, the more complicated it is to implement</a:t>
-            </a:r>
-          </a:p>
-          <a:p>
-            <a:pPr lvl="0"/>
-            <a:r>
-              <a:rPr lang="en-US" dirty="0"/>
-              <a:t>War stories</a:t>
-            </a:r>
-          </a:p>
-          <a:p>
-            <a:pPr lvl="0"/>
-            <a:r>
-              <a:rPr lang="en-US" dirty="0"/>
-              <a:t>Practical examples (too particular to a detriment and controlling the uncontrollable)</a:t>
-            </a:r>
-          </a:p>
-          <a:p>
-            <a:pPr lvl="0"/>
-            <a:r>
-              <a:rPr lang="en-US" dirty="0"/>
-              <a:t>Potential alternative – a guideline document?</a:t>
-            </a:r>
-          </a:p>
-          <a:p>
-            <a:pPr lvl="0"/>
-            <a:r>
-              <a:rPr lang="en-US" dirty="0"/>
-              <a:t>Trusting people</a:t>
-            </a:r>
-          </a:p>
-          <a:p>
-            <a:pPr lvl="0"/>
-            <a:r>
-              <a:rPr lang="en-US" dirty="0"/>
-              <a:t>If untrustworthy, keep things simpler, appoint more people or include independent persons?</a:t>
-            </a:r>
-          </a:p>
-          <a:p>
-            <a:pPr marL="63500" lvl="0" indent="0">
-              <a:buNone/>
-            </a:pPr>
-            <a:r>
-              <a:rPr lang="en-US" dirty="0"/>
-              <a:t>We have discussed giving assets directly compared to passing control.  There are benefits in passing control, but also disadvantages.</a:t>
+              <a:t>Get a Will in that Country!</a:t>
+            </a:r>
+          </a:p>
+          <a:p>
+            <a:pPr lvl="0"/>
+            <a:r>
+              <a:rPr lang="en-US" dirty="0"/>
+              <a:t>Consider tax issues if there are overseas beneficiaries (CGT event K3)</a:t>
+            </a:r>
+          </a:p>
+          <a:p>
+            <a:pPr lvl="0"/>
+            <a:r>
+              <a:rPr lang="en-US" dirty="0"/>
+              <a:t>FIRB and other surcharges for ‘foreigners’</a:t>
             </a:r>
           </a:p>
           <a:p>
@@ -7972,7 +7965,7 @@
     </p:spTree>
     <p:extLst>
       <p:ext uri="{BB962C8B-B14F-4D97-AF65-F5344CB8AC3E}">
-        <p14:creationId xmlns:p14="http://schemas.microsoft.com/office/powerpoint/2010/main" val="1216076185"/>
+        <p14:creationId xmlns:p14="http://schemas.microsoft.com/office/powerpoint/2010/main" val="893777579"/>
       </p:ext>
     </p:extLst>
   </p:cSld>
@@ -8022,7 +8015,7 @@
           <a:p>
             <a:r>
               <a:rPr lang="en-AU" dirty="0"/>
-              <a:t>Flexibility – questions to consider</a:t>
+              <a:t>Other issues</a:t>
             </a:r>
           </a:p>
         </p:txBody>
@@ -8051,89 +8044,76 @@
         </p:spPr>
         <p:txBody>
           <a:bodyPr>
-            <a:normAutofit lnSpcReduction="10000"/>
+            <a:normAutofit/>
           </a:bodyPr>
           <a:lstStyle/>
           <a:p>
             <a:pPr lvl="0"/>
             <a:r>
               <a:rPr lang="en-US" dirty="0"/>
-              <a:t>Do you want to leave some ‘guidelines’ or ‘rule beyond the grave’</a:t>
-            </a:r>
-            <a:r>
-              <a:rPr lang="en-AU" dirty="0"/>
-              <a:t>?</a:t>
-            </a:r>
-          </a:p>
-          <a:p>
-            <a:pPr lvl="0"/>
-            <a:r>
-              <a:rPr lang="en-US" dirty="0"/>
-              <a:t>If ruling beyond the grave, we will simplify things to remove any potential for abuse of power.</a:t>
-            </a:r>
-          </a:p>
-          <a:p>
-            <a:pPr lvl="0"/>
-            <a:r>
-              <a:rPr lang="en-US" dirty="0"/>
-              <a:t>If leaving some ‘guidelines’, do you trust those in control to </a:t>
-            </a:r>
-            <a:r>
-              <a:rPr lang="en-US" b="1" dirty="0"/>
-              <a:t>not </a:t>
-            </a:r>
-            <a:r>
-              <a:rPr lang="en-US" dirty="0"/>
-              <a:t>abuse their power?</a:t>
-            </a:r>
-          </a:p>
-          <a:p>
-            <a:pPr lvl="0"/>
-            <a:r>
-              <a:rPr lang="en-US" dirty="0"/>
-              <a:t>Think – if the persons in control </a:t>
-            </a:r>
-            <a:r>
-              <a:rPr lang="en-US" i="1" dirty="0"/>
-              <a:t>could</a:t>
-            </a:r>
-            <a:r>
-              <a:rPr lang="en-US" dirty="0"/>
-              <a:t> take all the assets for themselves, do I trust them </a:t>
-            </a:r>
-            <a:r>
-              <a:rPr lang="en-US" b="1" dirty="0"/>
-              <a:t>not</a:t>
-            </a:r>
-            <a:r>
-              <a:rPr lang="en-US" dirty="0"/>
-              <a:t> to?</a:t>
-            </a:r>
-          </a:p>
-          <a:p>
-            <a:pPr lvl="0"/>
-            <a:r>
-              <a:rPr lang="en-US" dirty="0"/>
-              <a:t>Should I appoint multiple people or an independent person(s)?</a:t>
-            </a:r>
-          </a:p>
-          <a:p>
-            <a:pPr lvl="0"/>
-            <a:r>
-              <a:rPr lang="en-US" dirty="0"/>
-              <a:t>Importantly, do I trust those in control to consider my guidelines and act in the best manner possible?</a:t>
-            </a:r>
-          </a:p>
-          <a:p>
-            <a:pPr marL="63500" lvl="0" indent="0">
+              <a:t>Funeral arrangements (recommended in memo of directions)</a:t>
+            </a:r>
+          </a:p>
+          <a:p>
+            <a:pPr lvl="0"/>
+            <a:r>
+              <a:rPr lang="en-US" dirty="0"/>
+              <a:t>Digital assets (pass under Will or license only)</a:t>
+            </a:r>
+          </a:p>
+          <a:p>
+            <a:pPr lvl="0"/>
+            <a:r>
+              <a:rPr lang="en-US" dirty="0"/>
+              <a:t>Intellectual property (including artwork, music etc.)</a:t>
+            </a:r>
+          </a:p>
+          <a:p>
+            <a:pPr lvl="0"/>
+            <a:r>
+              <a:rPr lang="en-US" dirty="0"/>
+              <a:t>Cryptocurrencies</a:t>
+            </a:r>
+          </a:p>
+          <a:p>
+            <a:pPr lvl="0"/>
+            <a:r>
+              <a:rPr lang="en-US" dirty="0"/>
+              <a:t>Loan accounts</a:t>
+            </a:r>
+          </a:p>
+          <a:p>
+            <a:pPr lvl="0"/>
+            <a:r>
+              <a:rPr lang="en-US" dirty="0"/>
+              <a:t>Liabilities and personal guarantees</a:t>
+            </a:r>
+          </a:p>
+          <a:p>
+            <a:pPr lvl="0"/>
+            <a:r>
+              <a:rPr lang="en-US" dirty="0"/>
+              <a:t>Life interests</a:t>
+            </a:r>
+          </a:p>
+          <a:p>
+            <a:pPr lvl="0"/>
+            <a:r>
+              <a:rPr lang="en-US" dirty="0"/>
+              <a:t>Binding financial agreements</a:t>
+            </a:r>
+          </a:p>
+          <a:p>
+            <a:pPr lvl="0"/>
+            <a:r>
+              <a:rPr lang="en-US" dirty="0"/>
+              <a:t>Other agreements</a:t>
+            </a:r>
+          </a:p>
+          <a:p>
+            <a:pPr marL="0" indent="0">
               <a:buNone/>
             </a:pPr>
-            <a:r>
-              <a:rPr lang="en-US" dirty="0"/>
-              <a:t>This ‘guideline’ document is called a ‘memo of directions’, and we provide you with a template to complete at your leisure.</a:t>
-            </a:r>
-          </a:p>
-          <a:p>
             <a:endParaRPr lang="en-AU" dirty="0"/>
           </a:p>
         </p:txBody>
@@ -8141,7 +8121,7 @@
     </p:spTree>
     <p:extLst>
       <p:ext uri="{BB962C8B-B14F-4D97-AF65-F5344CB8AC3E}">
-        <p14:creationId xmlns:p14="http://schemas.microsoft.com/office/powerpoint/2010/main" val="3701986101"/>
+        <p14:creationId xmlns:p14="http://schemas.microsoft.com/office/powerpoint/2010/main" val="4113091626"/>
       </p:ext>
     </p:extLst>
   </p:cSld>
@@ -8191,7 +8171,7 @@
           <a:p>
             <a:r>
               <a:rPr lang="en-AU" dirty="0"/>
-              <a:t>Memo of directions</a:t>
+              <a:t>Flexibility</a:t>
             </a:r>
           </a:p>
         </p:txBody>
@@ -8220,42 +8200,56 @@
         </p:spPr>
         <p:txBody>
           <a:bodyPr>
-            <a:normAutofit fontScale="92500"/>
+            <a:normAutofit/>
           </a:bodyPr>
           <a:lstStyle/>
           <a:p>
             <a:pPr lvl="0"/>
             <a:r>
               <a:rPr lang="en-US" dirty="0"/>
-              <a:t>This document allows you to document your intentions and guidelines</a:t>
-            </a:r>
-          </a:p>
-          <a:p>
-            <a:pPr lvl="0"/>
-            <a:r>
-              <a:rPr lang="en-US" dirty="0"/>
-              <a:t>It could be a blank piece of paper, or the template that we provide you</a:t>
-            </a:r>
-          </a:p>
-          <a:p>
-            <a:pPr lvl="0"/>
-            <a:r>
-              <a:rPr lang="en-US" dirty="0"/>
-              <a:t>It allows you to outline your thought process without fear of making things too restrictive with wording able to be ‘lax’ and personal</a:t>
-            </a:r>
-          </a:p>
-          <a:p>
-            <a:pPr lvl="0"/>
-            <a:r>
-              <a:rPr lang="en-US" dirty="0"/>
-              <a:t>Those looking after your affairs will at least then have a document that they can refer to when looking after your affairs</a:t>
-            </a:r>
-          </a:p>
-          <a:p>
-            <a:pPr lvl="0"/>
-            <a:r>
-              <a:rPr lang="en-US" dirty="0"/>
-              <a:t>It allows you to leave some non-binding directions so those in control can administer things per your intentions or administer things in a different manner if your directions are not appropriate at the relevant juncture (we are not mind readers and do not know what the future entails)</a:t>
+              <a:t>How flexible do you want to leave things?</a:t>
+            </a:r>
+          </a:p>
+          <a:p>
+            <a:pPr lvl="0"/>
+            <a:r>
+              <a:rPr lang="en-US" dirty="0"/>
+              <a:t>The more ‘set in stone’, the more complicated it is to implement</a:t>
+            </a:r>
+          </a:p>
+          <a:p>
+            <a:pPr lvl="0"/>
+            <a:r>
+              <a:rPr lang="en-US" dirty="0"/>
+              <a:t>War stories</a:t>
+            </a:r>
+          </a:p>
+          <a:p>
+            <a:pPr lvl="0"/>
+            <a:r>
+              <a:rPr lang="en-US" dirty="0"/>
+              <a:t>Practical examples (too particular to a detriment and controlling the uncontrollable)</a:t>
+            </a:r>
+          </a:p>
+          <a:p>
+            <a:pPr lvl="0"/>
+            <a:r>
+              <a:rPr lang="en-US" dirty="0"/>
+              <a:t>Potential alternative – a guideline document?</a:t>
+            </a:r>
+          </a:p>
+          <a:p>
+            <a:pPr lvl="0"/>
+            <a:r>
+              <a:rPr lang="en-US" dirty="0"/>
+              <a:t>Trusting people</a:t>
+            </a:r>
+          </a:p>
+          <a:p>
+            <a:pPr lvl="0"/>
+            <a:r>
+              <a:rPr lang="en-US" dirty="0"/>
+              <a:t>If untrustworthy, keep things simpler, appoint more people or include independent persons?</a:t>
             </a:r>
           </a:p>
           <a:p>
@@ -8264,7 +8258,7 @@
             </a:pPr>
             <a:r>
               <a:rPr lang="en-US" dirty="0"/>
-              <a:t>Keep a signed copy of this document with your Will and potentially circulate it to the key persons if you wish as well for their information.</a:t>
+              <a:t>We have discussed giving assets directly compared to passing control.  There are benefits in passing control, but also disadvantages.</a:t>
             </a:r>
           </a:p>
           <a:p>
@@ -8275,7 +8269,7 @@
     </p:spTree>
     <p:extLst>
       <p:ext uri="{BB962C8B-B14F-4D97-AF65-F5344CB8AC3E}">
-        <p14:creationId xmlns:p14="http://schemas.microsoft.com/office/powerpoint/2010/main" val="3834876061"/>
+        <p14:creationId xmlns:p14="http://schemas.microsoft.com/office/powerpoint/2010/main" val="1216076185"/>
       </p:ext>
     </p:extLst>
   </p:cSld>
@@ -8458,7 +8452,7 @@
           <a:p>
             <a:r>
               <a:rPr lang="en-AU" dirty="0"/>
-              <a:t>Will</a:t>
+              <a:t>Flexibility – questions to consider</a:t>
             </a:r>
           </a:p>
         </p:txBody>
@@ -8487,36 +8481,77 @@
         </p:spPr>
         <p:txBody>
           <a:bodyPr>
-            <a:normAutofit/>
+            <a:normAutofit lnSpcReduction="10000"/>
           </a:bodyPr>
           <a:lstStyle/>
           <a:p>
             <a:pPr lvl="0"/>
             <a:r>
               <a:rPr lang="en-US" dirty="0"/>
-              <a:t>Two general types of Will</a:t>
-            </a:r>
-          </a:p>
-          <a:p>
-            <a:pPr lvl="0"/>
-            <a:r>
-              <a:rPr lang="en-US" dirty="0"/>
-              <a:t>‘Simple’ Will – gives assets that goes into your Will directly to people (maybe with some conditions attaching)</a:t>
-            </a:r>
-          </a:p>
-          <a:p>
-            <a:pPr lvl="0"/>
-            <a:r>
-              <a:rPr lang="en-US" dirty="0"/>
-              <a:t>‘Testamentary trust’ Will – gives chosen assets that goes into your Will into a special structure that can be </a:t>
-            </a:r>
-            <a:r>
-              <a:rPr lang="en-US" dirty="0" err="1"/>
-              <a:t>utilised</a:t>
-            </a:r>
-            <a:r>
-              <a:rPr lang="en-US" dirty="0"/>
-              <a:t> for the benefit of a range of people – it offers various added benefits in exchange for a more complex arrangement</a:t>
+              <a:t>Do you want to leave some ‘guidelines’ or ‘rule beyond the grave’</a:t>
+            </a:r>
+            <a:r>
+              <a:rPr lang="en-AU" dirty="0"/>
+              <a:t>?</a:t>
+            </a:r>
+          </a:p>
+          <a:p>
+            <a:pPr lvl="0"/>
+            <a:r>
+              <a:rPr lang="en-US" dirty="0"/>
+              <a:t>If ruling beyond the grave, we will simplify things to remove any potential for abuse of power.</a:t>
+            </a:r>
+          </a:p>
+          <a:p>
+            <a:pPr lvl="0"/>
+            <a:r>
+              <a:rPr lang="en-US" dirty="0"/>
+              <a:t>If leaving some ‘guidelines’, do you trust those in control to </a:t>
+            </a:r>
+            <a:r>
+              <a:rPr lang="en-US" b="1" dirty="0"/>
+              <a:t>not </a:t>
+            </a:r>
+            <a:r>
+              <a:rPr lang="en-US" dirty="0"/>
+              <a:t>abuse their power?</a:t>
+            </a:r>
+          </a:p>
+          <a:p>
+            <a:pPr lvl="0"/>
+            <a:r>
+              <a:rPr lang="en-US" dirty="0"/>
+              <a:t>Think – if the persons in control </a:t>
+            </a:r>
+            <a:r>
+              <a:rPr lang="en-US" i="1" dirty="0"/>
+              <a:t>could</a:t>
+            </a:r>
+            <a:r>
+              <a:rPr lang="en-US" dirty="0"/>
+              <a:t> take all the assets for themselves, do I trust them </a:t>
+            </a:r>
+            <a:r>
+              <a:rPr lang="en-US" b="1" dirty="0"/>
+              <a:t>not</a:t>
+            </a:r>
+            <a:r>
+              <a:rPr lang="en-US" dirty="0"/>
+              <a:t> to?</a:t>
+            </a:r>
+          </a:p>
+          <a:p>
+            <a:pPr lvl="0"/>
+            <a:r>
+              <a:rPr lang="en-US" dirty="0"/>
+              <a:t>Should I appoint multiple people or an independent person(s)?</a:t>
+            </a:r>
+          </a:p>
+          <a:p>
+            <a:pPr lvl="0"/>
+            <a:r>
+              <a:rPr lang="en-US" dirty="0"/>
+              <a:t>Importantly, do I trust those in control to consider my guidelines and act in the best manner possible?</a:t>
             </a:r>
           </a:p>
           <a:p>
@@ -8525,7 +8560,7 @@
             </a:pPr>
             <a:r>
               <a:rPr lang="en-US" dirty="0"/>
-              <a:t>We will discuss the advantages and disadvantages of each approach and recommend what should be suitable for you</a:t>
+              <a:t>This ‘guideline’ document is called a ‘memo of directions’, and we provide you with a template to complete at your leisure.</a:t>
             </a:r>
           </a:p>
           <a:p>
@@ -8536,7 +8571,7 @@
     </p:spTree>
     <p:extLst>
       <p:ext uri="{BB962C8B-B14F-4D97-AF65-F5344CB8AC3E}">
-        <p14:creationId xmlns:p14="http://schemas.microsoft.com/office/powerpoint/2010/main" val="2789282318"/>
+        <p14:creationId xmlns:p14="http://schemas.microsoft.com/office/powerpoint/2010/main" val="3701986101"/>
       </p:ext>
     </p:extLst>
   </p:cSld>
@@ -8586,7 +8621,7 @@
           <a:p>
             <a:r>
               <a:rPr lang="en-AU" dirty="0"/>
-              <a:t>What is a testamentary trust</a:t>
+              <a:t>Memo of directions</a:t>
             </a:r>
           </a:p>
         </p:txBody>
@@ -8615,88 +8650,51 @@
         </p:spPr>
         <p:txBody>
           <a:bodyPr>
-            <a:normAutofit lnSpcReduction="10000"/>
+            <a:normAutofit fontScale="92500"/>
           </a:bodyPr>
           <a:lstStyle/>
           <a:p>
             <a:pPr lvl="0"/>
             <a:r>
               <a:rPr lang="en-US" dirty="0"/>
-              <a:t>A ‘trust’ is a relationship where: </a:t>
-            </a:r>
-          </a:p>
-          <a:p>
-            <a:pPr lvl="1"/>
-            <a:r>
-              <a:rPr lang="en-US" sz="1800" b="1" dirty="0"/>
-              <a:t>somebody </a:t>
-            </a:r>
-            <a:r>
-              <a:rPr lang="en-US" sz="1800" dirty="0"/>
-              <a:t>legally (called the trustee)</a:t>
-            </a:r>
-          </a:p>
-          <a:p>
-            <a:pPr lvl="1"/>
-            <a:r>
-              <a:rPr lang="en-US" sz="1800" dirty="0"/>
-              <a:t>holds </a:t>
-            </a:r>
-            <a:r>
-              <a:rPr lang="en-US" sz="1800" b="1" dirty="0"/>
-              <a:t>something </a:t>
-            </a:r>
-            <a:r>
-              <a:rPr lang="en-US" sz="1800" dirty="0"/>
-              <a:t>(assets in the trust)</a:t>
-            </a:r>
-          </a:p>
-          <a:p>
-            <a:pPr lvl="1"/>
-            <a:r>
-              <a:rPr lang="en-US" sz="1800" dirty="0"/>
-              <a:t>for </a:t>
-            </a:r>
-            <a:r>
-              <a:rPr lang="en-US" sz="1800" b="1" dirty="0"/>
-              <a:t>others’</a:t>
-            </a:r>
-            <a:r>
-              <a:rPr lang="en-US" sz="1800" dirty="0"/>
-              <a:t> benefit (called the beneficiaries)</a:t>
-            </a:r>
-          </a:p>
-          <a:p>
-            <a:r>
-              <a:rPr lang="en-US" dirty="0"/>
-              <a:t>‘Testamentary’ just means that it is created on after you pass away (and therefore the assets of this trust are assets that form part of your Will)</a:t>
-            </a:r>
-          </a:p>
-          <a:p>
-            <a:r>
-              <a:rPr lang="en-US" dirty="0"/>
-              <a:t>Lasts for 80 years in all Australian jurisdictions other than South Australia</a:t>
-            </a:r>
-          </a:p>
-          <a:p>
-            <a:r>
-              <a:rPr lang="en-US" dirty="0"/>
-              <a:t>Beneficiary class limited to named persons and lineal descendants</a:t>
-            </a:r>
-          </a:p>
-          <a:p>
-            <a:r>
-              <a:rPr lang="en-US" dirty="0"/>
-              <a:t>May exclude foreign persons if property passes into trust</a:t>
-            </a:r>
-          </a:p>
-          <a:p>
-            <a:pPr marL="63500" indent="0">
+              <a:t>This document allows you to document your intentions and guidelines</a:t>
+            </a:r>
+          </a:p>
+          <a:p>
+            <a:pPr lvl="0"/>
+            <a:r>
+              <a:rPr lang="en-US" dirty="0"/>
+              <a:t>It could be a blank piece of paper, or the template that we provide you</a:t>
+            </a:r>
+          </a:p>
+          <a:p>
+            <a:pPr lvl="0"/>
+            <a:r>
+              <a:rPr lang="en-US" dirty="0"/>
+              <a:t>It allows you to outline your thought process without fear of making things too restrictive with wording able to be ‘lax’ and personal</a:t>
+            </a:r>
+          </a:p>
+          <a:p>
+            <a:pPr lvl="0"/>
+            <a:r>
+              <a:rPr lang="en-US" dirty="0"/>
+              <a:t>Those looking after your affairs will at least then have a document that they can refer to when looking after your affairs</a:t>
+            </a:r>
+          </a:p>
+          <a:p>
+            <a:pPr lvl="0"/>
+            <a:r>
+              <a:rPr lang="en-US" dirty="0"/>
+              <a:t>It allows you to leave some non-binding directions so those in control can administer things per your intentions or administer things in a different manner if your directions are not appropriate at the relevant juncture (we are not mind readers and do not know what the future entails)</a:t>
+            </a:r>
+          </a:p>
+          <a:p>
+            <a:pPr marL="63500" lvl="0" indent="0">
               <a:buNone/>
             </a:pPr>
             <a:r>
               <a:rPr lang="en-US" dirty="0"/>
-              <a:t>If you do not ‘get’ the concept after these slides, let me know as this structure will not be suitable for use.</a:t>
+              <a:t>Keep a signed copy of this document with your Will and potentially circulate it to the key persons if you wish as well for their information.</a:t>
             </a:r>
           </a:p>
           <a:p>
@@ -8707,7 +8705,7 @@
     </p:spTree>
     <p:extLst>
       <p:ext uri="{BB962C8B-B14F-4D97-AF65-F5344CB8AC3E}">
-        <p14:creationId xmlns:p14="http://schemas.microsoft.com/office/powerpoint/2010/main" val="1564623478"/>
+        <p14:creationId xmlns:p14="http://schemas.microsoft.com/office/powerpoint/2010/main" val="3834876061"/>
       </p:ext>
     </p:extLst>
   </p:cSld>
@@ -8757,15 +8755,85 @@
           <a:p>
             <a:r>
               <a:rPr lang="en-AU" dirty="0"/>
-              <a:t>Testamentary trusts</a:t>
-            </a:r>
+              <a:t>Will</a:t>
+            </a:r>
+          </a:p>
+        </p:txBody>
+      </p:sp>
+      <p:sp>
+        <p:nvSpPr>
+          <p:cNvPr id="3" name="Content Placeholder 2">
+            <a:extLst>
+              <a:ext uri="{FF2B5EF4-FFF2-40B4-BE49-F238E27FC236}">
+                <a16:creationId xmlns:a16="http://schemas.microsoft.com/office/drawing/2014/main" id="{8F87A3BB-4F12-4FEB-B7D2-BA2CC372E9C6}"/>
+              </a:ext>
+            </a:extLst>
+          </p:cNvPr>
+          <p:cNvSpPr>
+            <a:spLocks noGrp="1"/>
+          </p:cNvSpPr>
+          <p:nvPr>
+            <p:ph idx="1"/>
+          </p:nvPr>
+        </p:nvSpPr>
+        <p:spPr>
+          <a:xfrm>
+            <a:off x="1261872" y="1828800"/>
+            <a:ext cx="8595360" cy="4735002"/>
+          </a:xfrm>
+        </p:spPr>
+        <p:txBody>
+          <a:bodyPr>
+            <a:normAutofit/>
+          </a:bodyPr>
+          <a:lstStyle/>
+          <a:p>
+            <a:pPr lvl="0"/>
+            <a:r>
+              <a:rPr lang="en-US" dirty="0"/>
+              <a:t>Two general types of Will</a:t>
+            </a:r>
+          </a:p>
+          <a:p>
+            <a:pPr lvl="0"/>
+            <a:r>
+              <a:rPr lang="en-US" dirty="0"/>
+              <a:t>‘Simple’ Will – gives assets that goes into your Will directly to people (maybe with some conditions attaching)</a:t>
+            </a:r>
+          </a:p>
+          <a:p>
+            <a:pPr lvl="0"/>
+            <a:r>
+              <a:rPr lang="en-US" dirty="0"/>
+              <a:t>‘Testamentary trust’ Will – gives chosen assets that goes into your Will into a special structure that can be </a:t>
+            </a:r>
+            <a:r>
+              <a:rPr lang="en-US" dirty="0" err="1"/>
+              <a:t>utilised</a:t>
+            </a:r>
+            <a:r>
+              <a:rPr lang="en-US" dirty="0"/>
+              <a:t> for the benefit of a range of people – it offers various added benefits in exchange for a more complex arrangement</a:t>
+            </a:r>
+          </a:p>
+          <a:p>
+            <a:pPr marL="63500" lvl="0" indent="0">
+              <a:buNone/>
+            </a:pPr>
+            <a:r>
+              <a:rPr lang="en-US" dirty="0"/>
+              <a:t>We will discuss the advantages and disadvantages of each approach and recommend what should be suitable for you</a:t>
+            </a:r>
+          </a:p>
+          <a:p>
+            <a:endParaRPr lang="en-AU" dirty="0"/>
           </a:p>
         </p:txBody>
       </p:sp>
     </p:spTree>
     <p:extLst>
       <p:ext uri="{BB962C8B-B14F-4D97-AF65-F5344CB8AC3E}">
-        <p14:creationId xmlns:p14="http://schemas.microsoft.com/office/powerpoint/2010/main" val="3922821135"/>
+        <p14:creationId xmlns:p14="http://schemas.microsoft.com/office/powerpoint/2010/main" val="2789282318"/>
       </p:ext>
     </p:extLst>
   </p:cSld>
@@ -8815,6 +8883,425 @@
           <a:p>
             <a:r>
               <a:rPr lang="en-AU" dirty="0"/>
+              <a:t>What is a testamentary trust</a:t>
+            </a:r>
+          </a:p>
+        </p:txBody>
+      </p:sp>
+      <p:sp>
+        <p:nvSpPr>
+          <p:cNvPr id="3" name="Content Placeholder 2">
+            <a:extLst>
+              <a:ext uri="{FF2B5EF4-FFF2-40B4-BE49-F238E27FC236}">
+                <a16:creationId xmlns:a16="http://schemas.microsoft.com/office/drawing/2014/main" id="{8F87A3BB-4F12-4FEB-B7D2-BA2CC372E9C6}"/>
+              </a:ext>
+            </a:extLst>
+          </p:cNvPr>
+          <p:cNvSpPr>
+            <a:spLocks noGrp="1"/>
+          </p:cNvSpPr>
+          <p:nvPr>
+            <p:ph idx="1"/>
+          </p:nvPr>
+        </p:nvSpPr>
+        <p:spPr>
+          <a:xfrm>
+            <a:off x="1261872" y="1828800"/>
+            <a:ext cx="8595360" cy="4735002"/>
+          </a:xfrm>
+        </p:spPr>
+        <p:txBody>
+          <a:bodyPr>
+            <a:normAutofit lnSpcReduction="10000"/>
+          </a:bodyPr>
+          <a:lstStyle/>
+          <a:p>
+            <a:pPr lvl="0"/>
+            <a:r>
+              <a:rPr lang="en-US" dirty="0"/>
+              <a:t>A ‘trust’ is a relationship where: </a:t>
+            </a:r>
+          </a:p>
+          <a:p>
+            <a:pPr lvl="1"/>
+            <a:r>
+              <a:rPr lang="en-US" sz="1800" b="1" dirty="0"/>
+              <a:t>somebody </a:t>
+            </a:r>
+            <a:r>
+              <a:rPr lang="en-US" sz="1800" dirty="0"/>
+              <a:t>legally (called the trustee)</a:t>
+            </a:r>
+          </a:p>
+          <a:p>
+            <a:pPr lvl="1"/>
+            <a:r>
+              <a:rPr lang="en-US" sz="1800" dirty="0"/>
+              <a:t>holds </a:t>
+            </a:r>
+            <a:r>
+              <a:rPr lang="en-US" sz="1800" b="1" dirty="0"/>
+              <a:t>something </a:t>
+            </a:r>
+            <a:r>
+              <a:rPr lang="en-US" sz="1800" dirty="0"/>
+              <a:t>(assets in the trust)</a:t>
+            </a:r>
+          </a:p>
+          <a:p>
+            <a:pPr lvl="1"/>
+            <a:r>
+              <a:rPr lang="en-US" sz="1800" dirty="0"/>
+              <a:t>for </a:t>
+            </a:r>
+            <a:r>
+              <a:rPr lang="en-US" sz="1800" b="1" dirty="0"/>
+              <a:t>others’</a:t>
+            </a:r>
+            <a:r>
+              <a:rPr lang="en-US" sz="1800" dirty="0"/>
+              <a:t> benefit (called the beneficiaries)</a:t>
+            </a:r>
+          </a:p>
+          <a:p>
+            <a:r>
+              <a:rPr lang="en-US" dirty="0"/>
+              <a:t>‘Testamentary’ just means that it is created on after you pass away (and therefore the assets of this trust are assets that form part of your Will)</a:t>
+            </a:r>
+          </a:p>
+          <a:p>
+            <a:r>
+              <a:rPr lang="en-US" dirty="0"/>
+              <a:t>Lasts for 80 years in all Australian jurisdictions other than South Australia</a:t>
+            </a:r>
+          </a:p>
+          <a:p>
+            <a:r>
+              <a:rPr lang="en-US" dirty="0"/>
+              <a:t>Beneficiary class limited to named persons and lineal descendants</a:t>
+            </a:r>
+          </a:p>
+          <a:p>
+            <a:r>
+              <a:rPr lang="en-US" dirty="0"/>
+              <a:t>May exclude foreign persons if property passes into trust</a:t>
+            </a:r>
+          </a:p>
+          <a:p>
+            <a:pPr marL="63500" indent="0">
+              <a:buNone/>
+            </a:pPr>
+            <a:r>
+              <a:rPr lang="en-US" dirty="0"/>
+              <a:t>If you do not ‘get’ the concept after these slides, let me know as this structure will not be suitable for use.</a:t>
+            </a:r>
+          </a:p>
+          <a:p>
+            <a:endParaRPr lang="en-AU" dirty="0"/>
+          </a:p>
+        </p:txBody>
+      </p:sp>
+    </p:spTree>
+    <p:extLst>
+      <p:ext uri="{BB962C8B-B14F-4D97-AF65-F5344CB8AC3E}">
+        <p14:creationId xmlns:p14="http://schemas.microsoft.com/office/powerpoint/2010/main" val="1564623478"/>
+      </p:ext>
+    </p:extLst>
+  </p:cSld>
+  <p:clrMapOvr>
+    <a:masterClrMapping/>
+  </p:clrMapOvr>
+</p:sld>
+</file>
+
+<file path=ppt/slides/slide34.xml><?xml version="1.0" encoding="utf-8"?>
+<p:sld xmlns:a="http://schemas.openxmlformats.org/drawingml/2006/main" xmlns:r="http://schemas.openxmlformats.org/officeDocument/2006/relationships" xmlns:p="http://schemas.openxmlformats.org/presentationml/2006/main">
+  <p:cSld>
+    <p:spTree>
+      <p:nvGrpSpPr>
+        <p:cNvPr id="1" name="">
+          <a:extLst>
+            <a:ext uri="{FF2B5EF4-FFF2-40B4-BE49-F238E27FC236}">
+              <a16:creationId xmlns:a16="http://schemas.microsoft.com/office/drawing/2014/main" id="{4BCCA249-7BFA-F3EC-F032-342575930A95}"/>
+            </a:ext>
+          </a:extLst>
+        </p:cNvPr>
+        <p:cNvGrpSpPr/>
+        <p:nvPr/>
+      </p:nvGrpSpPr>
+      <p:grpSpPr>
+        <a:xfrm>
+          <a:off x="0" y="0"/>
+          <a:ext cx="0" cy="0"/>
+          <a:chOff x="0" y="0"/>
+          <a:chExt cx="0" cy="0"/>
+        </a:xfrm>
+      </p:grpSpPr>
+      <p:sp>
+        <p:nvSpPr>
+          <p:cNvPr id="2" name="Title 1">
+            <a:extLst>
+              <a:ext uri="{FF2B5EF4-FFF2-40B4-BE49-F238E27FC236}">
+                <a16:creationId xmlns:a16="http://schemas.microsoft.com/office/drawing/2014/main" id="{C2DA0CAB-773C-24CB-9180-0ABB803C4D66}"/>
+              </a:ext>
+            </a:extLst>
+          </p:cNvPr>
+          <p:cNvSpPr>
+            <a:spLocks noGrp="1"/>
+          </p:cNvSpPr>
+          <p:nvPr>
+            <p:ph type="title"/>
+          </p:nvPr>
+        </p:nvSpPr>
+        <p:spPr/>
+        <p:txBody>
+          <a:bodyPr/>
+          <a:lstStyle/>
+          <a:p>
+            <a:r>
+              <a:rPr lang="en-AU" dirty="0"/>
+              <a:t>Testamentary trust and minor children</a:t>
+            </a:r>
+          </a:p>
+        </p:txBody>
+      </p:sp>
+      <p:sp>
+        <p:nvSpPr>
+          <p:cNvPr id="3" name="Content Placeholder 2">
+            <a:extLst>
+              <a:ext uri="{FF2B5EF4-FFF2-40B4-BE49-F238E27FC236}">
+                <a16:creationId xmlns:a16="http://schemas.microsoft.com/office/drawing/2014/main" id="{3775F0C0-1651-F7F2-C1C5-0509452E4FCA}"/>
+              </a:ext>
+            </a:extLst>
+          </p:cNvPr>
+          <p:cNvSpPr>
+            <a:spLocks noGrp="1"/>
+          </p:cNvSpPr>
+          <p:nvPr>
+            <p:ph idx="1"/>
+          </p:nvPr>
+        </p:nvSpPr>
+        <p:spPr>
+          <a:xfrm>
+            <a:off x="1261872" y="1828800"/>
+            <a:ext cx="8595360" cy="4735002"/>
+          </a:xfrm>
+        </p:spPr>
+        <p:txBody>
+          <a:bodyPr>
+            <a:normAutofit/>
+          </a:bodyPr>
+          <a:lstStyle/>
+          <a:p>
+            <a:pPr lvl="0"/>
+            <a:r>
+              <a:rPr lang="en-US" dirty="0"/>
+              <a:t>Trust established during lifetime – distributions to minor children:</a:t>
+            </a:r>
+          </a:p>
+          <a:p>
+            <a:pPr lvl="1"/>
+            <a:r>
+              <a:rPr lang="en-US" dirty="0"/>
+              <a:t>$0 - $416 – nil</a:t>
+            </a:r>
+          </a:p>
+          <a:p>
+            <a:pPr lvl="1"/>
+            <a:r>
+              <a:rPr lang="en-US" dirty="0"/>
+              <a:t>$417 - $1,307 – nil plus 66% of excess over $416</a:t>
+            </a:r>
+          </a:p>
+          <a:p>
+            <a:pPr lvl="1"/>
+            <a:r>
+              <a:rPr lang="en-US" dirty="0"/>
+              <a:t>Over $1,307 – 45% of the total amount of income that is not excepted income</a:t>
+            </a:r>
+          </a:p>
+          <a:p>
+            <a:r>
+              <a:rPr lang="en-US" dirty="0"/>
+              <a:t>Excepted income includes ‘</a:t>
+            </a:r>
+            <a:r>
+              <a:rPr lang="en-US" i="1" dirty="0"/>
+              <a:t>income…of a trust estate that resulted from: (</a:t>
+            </a:r>
+            <a:r>
+              <a:rPr lang="en-US" i="1" dirty="0" err="1"/>
+              <a:t>i</a:t>
+            </a:r>
+            <a:r>
+              <a:rPr lang="en-US" i="1" dirty="0"/>
+              <a:t>) a will)’ – </a:t>
+            </a:r>
+            <a:r>
+              <a:rPr lang="en-US" dirty="0"/>
+              <a:t>section 102 AG 1936 Tax Act</a:t>
+            </a:r>
+          </a:p>
+          <a:p>
+            <a:r>
+              <a:rPr lang="en-US" dirty="0"/>
+              <a:t>Normal tax rate:</a:t>
+            </a:r>
+          </a:p>
+          <a:p>
+            <a:pPr lvl="1"/>
+            <a:r>
+              <a:rPr lang="en-US" dirty="0"/>
+              <a:t>$0 - $18,200 – nil</a:t>
+            </a:r>
+          </a:p>
+          <a:p>
+            <a:pPr lvl="1"/>
+            <a:r>
+              <a:rPr lang="en-US" dirty="0"/>
+              <a:t>$18,201 - $45,000 – 16% above $18,200</a:t>
+            </a:r>
+          </a:p>
+          <a:p>
+            <a:pPr lvl="1"/>
+            <a:r>
+              <a:rPr lang="en-US" dirty="0"/>
+              <a:t>$45,001 - $135,000 - $4,288 plus 30% above $45,000</a:t>
+            </a:r>
+          </a:p>
+          <a:p>
+            <a:pPr lvl="1"/>
+            <a:r>
+              <a:rPr lang="en-US" dirty="0"/>
+              <a:t>$135,001 - $190,000 - $31,288 plus 37% above $135,000</a:t>
+            </a:r>
+          </a:p>
+          <a:p>
+            <a:pPr lvl="1"/>
+            <a:r>
+              <a:rPr lang="en-US" dirty="0"/>
+              <a:t>$190,001 and above - $51,648 plus 45% above $190,000</a:t>
+            </a:r>
+          </a:p>
+          <a:p>
+            <a:endParaRPr lang="en-US" dirty="0"/>
+          </a:p>
+          <a:p>
+            <a:endParaRPr lang="en-AU" dirty="0"/>
+          </a:p>
+        </p:txBody>
+      </p:sp>
+    </p:spTree>
+    <p:extLst>
+      <p:ext uri="{BB962C8B-B14F-4D97-AF65-F5344CB8AC3E}">
+        <p14:creationId xmlns:p14="http://schemas.microsoft.com/office/powerpoint/2010/main" val="782846654"/>
+      </p:ext>
+    </p:extLst>
+  </p:cSld>
+  <p:clrMapOvr>
+    <a:masterClrMapping/>
+  </p:clrMapOvr>
+</p:sld>
+</file>
+
+<file path=ppt/slides/slide35.xml><?xml version="1.0" encoding="utf-8"?>
+<p:sld xmlns:a="http://schemas.openxmlformats.org/drawingml/2006/main" xmlns:r="http://schemas.openxmlformats.org/officeDocument/2006/relationships" xmlns:p="http://schemas.openxmlformats.org/presentationml/2006/main">
+  <p:cSld>
+    <p:spTree>
+      <p:nvGrpSpPr>
+        <p:cNvPr id="1" name=""/>
+        <p:cNvGrpSpPr/>
+        <p:nvPr/>
+      </p:nvGrpSpPr>
+      <p:grpSpPr>
+        <a:xfrm>
+          <a:off x="0" y="0"/>
+          <a:ext cx="0" cy="0"/>
+          <a:chOff x="0" y="0"/>
+          <a:chExt cx="0" cy="0"/>
+        </a:xfrm>
+      </p:grpSpPr>
+      <p:sp>
+        <p:nvSpPr>
+          <p:cNvPr id="2" name="Title 1">
+            <a:extLst>
+              <a:ext uri="{FF2B5EF4-FFF2-40B4-BE49-F238E27FC236}">
+                <a16:creationId xmlns:a16="http://schemas.microsoft.com/office/drawing/2014/main" id="{7F5CD355-0B6A-4ED3-93F5-802B5D5D5AE6}"/>
+              </a:ext>
+            </a:extLst>
+          </p:cNvPr>
+          <p:cNvSpPr>
+            <a:spLocks noGrp="1"/>
+          </p:cNvSpPr>
+          <p:nvPr>
+            <p:ph type="title"/>
+          </p:nvPr>
+        </p:nvSpPr>
+        <p:spPr/>
+        <p:txBody>
+          <a:bodyPr/>
+          <a:lstStyle/>
+          <a:p>
+            <a:r>
+              <a:rPr lang="en-AU" dirty="0"/>
+              <a:t>Testamentary trusts</a:t>
+            </a:r>
+          </a:p>
+        </p:txBody>
+      </p:sp>
+    </p:spTree>
+    <p:extLst>
+      <p:ext uri="{BB962C8B-B14F-4D97-AF65-F5344CB8AC3E}">
+        <p14:creationId xmlns:p14="http://schemas.microsoft.com/office/powerpoint/2010/main" val="3922821135"/>
+      </p:ext>
+    </p:extLst>
+  </p:cSld>
+  <p:clrMapOvr>
+    <a:masterClrMapping/>
+  </p:clrMapOvr>
+</p:sld>
+</file>
+
+<file path=ppt/slides/slide36.xml><?xml version="1.0" encoding="utf-8"?>
+<p:sld xmlns:a="http://schemas.openxmlformats.org/drawingml/2006/main" xmlns:r="http://schemas.openxmlformats.org/officeDocument/2006/relationships" xmlns:p="http://schemas.openxmlformats.org/presentationml/2006/main">
+  <p:cSld>
+    <p:spTree>
+      <p:nvGrpSpPr>
+        <p:cNvPr id="1" name=""/>
+        <p:cNvGrpSpPr/>
+        <p:nvPr/>
+      </p:nvGrpSpPr>
+      <p:grpSpPr>
+        <a:xfrm>
+          <a:off x="0" y="0"/>
+          <a:ext cx="0" cy="0"/>
+          <a:chOff x="0" y="0"/>
+          <a:chExt cx="0" cy="0"/>
+        </a:xfrm>
+      </p:grpSpPr>
+      <p:sp>
+        <p:nvSpPr>
+          <p:cNvPr id="2" name="Title 1">
+            <a:extLst>
+              <a:ext uri="{FF2B5EF4-FFF2-40B4-BE49-F238E27FC236}">
+                <a16:creationId xmlns:a16="http://schemas.microsoft.com/office/drawing/2014/main" id="{7F5CD355-0B6A-4ED3-93F5-802B5D5D5AE6}"/>
+              </a:ext>
+            </a:extLst>
+          </p:cNvPr>
+          <p:cNvSpPr>
+            <a:spLocks noGrp="1"/>
+          </p:cNvSpPr>
+          <p:nvPr>
+            <p:ph type="title"/>
+          </p:nvPr>
+        </p:nvSpPr>
+        <p:spPr/>
+        <p:txBody>
+          <a:bodyPr/>
+          <a:lstStyle/>
+          <a:p>
+            <a:r>
+              <a:rPr lang="en-AU" dirty="0"/>
               <a:t>Protection of testamentary trusts</a:t>
             </a:r>
           </a:p>
@@ -8912,7 +9399,7 @@
 </p:sld>
 </file>
 
-<file path=ppt/slides/slide34.xml><?xml version="1.0" encoding="utf-8"?>
+<file path=ppt/slides/slide37.xml><?xml version="1.0" encoding="utf-8"?>
 <p:sld xmlns:a="http://schemas.openxmlformats.org/drawingml/2006/main" xmlns:r="http://schemas.openxmlformats.org/officeDocument/2006/relationships" xmlns:p="http://schemas.openxmlformats.org/presentationml/2006/main">
   <p:cSld>
     <p:spTree>
@@ -9671,7 +10158,7 @@
 </p:sld>
 </file>
 
-<file path=ppt/slides/slide35.xml><?xml version="1.0" encoding="utf-8"?>
+<file path=ppt/slides/slide38.xml><?xml version="1.0" encoding="utf-8"?>
 <p:sld xmlns:a="http://schemas.openxmlformats.org/drawingml/2006/main" xmlns:r="http://schemas.openxmlformats.org/officeDocument/2006/relationships" xmlns:p="http://schemas.openxmlformats.org/presentationml/2006/main">
   <p:cSld>
     <p:spTree>
@@ -10059,7 +10546,7 @@
 </p:sld>
 </file>
 
-<file path=ppt/slides/slide36.xml><?xml version="1.0" encoding="utf-8"?>
+<file path=ppt/slides/slide39.xml><?xml version="1.0" encoding="utf-8"?>
 <p:sld xmlns:a="http://schemas.openxmlformats.org/drawingml/2006/main" xmlns:r="http://schemas.openxmlformats.org/officeDocument/2006/relationships" xmlns:p="http://schemas.openxmlformats.org/presentationml/2006/main">
   <p:cSld>
     <p:spTree>
@@ -10674,358 +11161,6 @@
 </p:sld>
 </file>
 
-<file path=ppt/slides/slide37.xml><?xml version="1.0" encoding="utf-8"?>
-<p:sld xmlns:a="http://schemas.openxmlformats.org/drawingml/2006/main" xmlns:r="http://schemas.openxmlformats.org/officeDocument/2006/relationships" xmlns:p="http://schemas.openxmlformats.org/presentationml/2006/main">
-  <p:cSld>
-    <p:spTree>
-      <p:nvGrpSpPr>
-        <p:cNvPr id="1" name=""/>
-        <p:cNvGrpSpPr/>
-        <p:nvPr/>
-      </p:nvGrpSpPr>
-      <p:grpSpPr>
-        <a:xfrm>
-          <a:off x="0" y="0"/>
-          <a:ext cx="0" cy="0"/>
-          <a:chOff x="0" y="0"/>
-          <a:chExt cx="0" cy="0"/>
-        </a:xfrm>
-      </p:grpSpPr>
-      <p:sp>
-        <p:nvSpPr>
-          <p:cNvPr id="2" name="Title 1">
-            <a:extLst>
-              <a:ext uri="{FF2B5EF4-FFF2-40B4-BE49-F238E27FC236}">
-                <a16:creationId xmlns:a16="http://schemas.microsoft.com/office/drawing/2014/main" id="{7F5CD355-0B6A-4ED3-93F5-802B5D5D5AE6}"/>
-              </a:ext>
-            </a:extLst>
-          </p:cNvPr>
-          <p:cNvSpPr>
-            <a:spLocks noGrp="1"/>
-          </p:cNvSpPr>
-          <p:nvPr>
-            <p:ph type="title"/>
-          </p:nvPr>
-        </p:nvSpPr>
-        <p:spPr>
-          <a:xfrm>
-            <a:off x="1428926" y="2272468"/>
-            <a:ext cx="9692640" cy="1397124"/>
-          </a:xfrm>
-        </p:spPr>
-        <p:txBody>
-          <a:bodyPr/>
-          <a:lstStyle/>
-          <a:p>
-            <a:r>
-              <a:rPr lang="en-AU" dirty="0"/>
-              <a:t>Your estate plan and our advice</a:t>
-            </a:r>
-          </a:p>
-        </p:txBody>
-      </p:sp>
-    </p:spTree>
-    <p:extLst>
-      <p:ext uri="{BB962C8B-B14F-4D97-AF65-F5344CB8AC3E}">
-        <p14:creationId xmlns:p14="http://schemas.microsoft.com/office/powerpoint/2010/main" val="3018810443"/>
-      </p:ext>
-    </p:extLst>
-  </p:cSld>
-  <p:clrMapOvr>
-    <a:masterClrMapping/>
-  </p:clrMapOvr>
-</p:sld>
-</file>
-
-<file path=ppt/slides/slide38.xml><?xml version="1.0" encoding="utf-8"?>
-<p:sld xmlns:a="http://schemas.openxmlformats.org/drawingml/2006/main" xmlns:r="http://schemas.openxmlformats.org/officeDocument/2006/relationships" xmlns:p="http://schemas.openxmlformats.org/presentationml/2006/main">
-  <p:cSld>
-    <p:spTree>
-      <p:nvGrpSpPr>
-        <p:cNvPr id="1" name=""/>
-        <p:cNvGrpSpPr/>
-        <p:nvPr/>
-      </p:nvGrpSpPr>
-      <p:grpSpPr>
-        <a:xfrm>
-          <a:off x="0" y="0"/>
-          <a:ext cx="0" cy="0"/>
-          <a:chOff x="0" y="0"/>
-          <a:chExt cx="0" cy="0"/>
-        </a:xfrm>
-      </p:grpSpPr>
-      <p:sp>
-        <p:nvSpPr>
-          <p:cNvPr id="2" name="Title 1">
-            <a:extLst>
-              <a:ext uri="{FF2B5EF4-FFF2-40B4-BE49-F238E27FC236}">
-                <a16:creationId xmlns:a16="http://schemas.microsoft.com/office/drawing/2014/main" id="{7F5CD355-0B6A-4ED3-93F5-802B5D5D5AE6}"/>
-              </a:ext>
-            </a:extLst>
-          </p:cNvPr>
-          <p:cNvSpPr>
-            <a:spLocks noGrp="1"/>
-          </p:cNvSpPr>
-          <p:nvPr>
-            <p:ph type="title"/>
-          </p:nvPr>
-        </p:nvSpPr>
-        <p:spPr/>
-        <p:txBody>
-          <a:bodyPr/>
-          <a:lstStyle/>
-          <a:p>
-            <a:r>
-              <a:rPr lang="en-AU" dirty="0"/>
-              <a:t>Personal assets - Will</a:t>
-            </a:r>
-          </a:p>
-        </p:txBody>
-      </p:sp>
-      <p:sp>
-        <p:nvSpPr>
-          <p:cNvPr id="3" name="Content Placeholder 2">
-            <a:extLst>
-              <a:ext uri="{FF2B5EF4-FFF2-40B4-BE49-F238E27FC236}">
-                <a16:creationId xmlns:a16="http://schemas.microsoft.com/office/drawing/2014/main" id="{8F87A3BB-4F12-4FEB-B7D2-BA2CC372E9C6}"/>
-              </a:ext>
-            </a:extLst>
-          </p:cNvPr>
-          <p:cNvSpPr>
-            <a:spLocks noGrp="1"/>
-          </p:cNvSpPr>
-          <p:nvPr>
-            <p:ph idx="1"/>
-          </p:nvPr>
-        </p:nvSpPr>
-        <p:spPr>
-          <a:xfrm>
-            <a:off x="1261872" y="1828800"/>
-            <a:ext cx="8595360" cy="4735002"/>
-          </a:xfrm>
-        </p:spPr>
-        <p:txBody>
-          <a:bodyPr>
-            <a:normAutofit/>
-          </a:bodyPr>
-          <a:lstStyle/>
-          <a:p>
-            <a:pPr lvl="0"/>
-            <a:r>
-              <a:rPr lang="en-US" dirty="0"/>
-              <a:t>Contemplation of marriage or divorce?</a:t>
-            </a:r>
-          </a:p>
-          <a:p>
-            <a:pPr lvl="0"/>
-            <a:r>
-              <a:rPr lang="en-US" dirty="0"/>
-              <a:t>Only governs Australian assets and revokes Australian Wills</a:t>
-            </a:r>
-          </a:p>
-          <a:p>
-            <a:pPr lvl="0"/>
-            <a:r>
-              <a:rPr lang="en-US" dirty="0"/>
-              <a:t>Testamentary trust used?</a:t>
-            </a:r>
-          </a:p>
-          <a:p>
-            <a:pPr lvl="0"/>
-            <a:r>
-              <a:rPr lang="en-US" dirty="0"/>
-              <a:t>Executor?</a:t>
-            </a:r>
-          </a:p>
-          <a:p>
-            <a:pPr lvl="0"/>
-            <a:r>
-              <a:rPr lang="en-US" dirty="0"/>
-              <a:t>Guardians?</a:t>
-            </a:r>
-          </a:p>
-          <a:p>
-            <a:pPr lvl="0"/>
-            <a:r>
-              <a:rPr lang="en-US" dirty="0"/>
-              <a:t>Specific gifts?</a:t>
-            </a:r>
-          </a:p>
-          <a:p>
-            <a:pPr lvl="0"/>
-            <a:r>
-              <a:rPr lang="en-US" dirty="0"/>
-              <a:t>Personal Property*?</a:t>
-            </a:r>
-          </a:p>
-          <a:p>
-            <a:pPr lvl="0"/>
-            <a:r>
-              <a:rPr lang="en-US" dirty="0"/>
-              <a:t>Everything else?</a:t>
-            </a:r>
-          </a:p>
-          <a:p>
-            <a:endParaRPr lang="en-AU" dirty="0"/>
-          </a:p>
-        </p:txBody>
-      </p:sp>
-    </p:spTree>
-    <p:extLst>
-      <p:ext uri="{BB962C8B-B14F-4D97-AF65-F5344CB8AC3E}">
-        <p14:creationId xmlns:p14="http://schemas.microsoft.com/office/powerpoint/2010/main" val="3724005480"/>
-      </p:ext>
-    </p:extLst>
-  </p:cSld>
-  <p:clrMapOvr>
-    <a:masterClrMapping/>
-  </p:clrMapOvr>
-</p:sld>
-</file>
-
-<file path=ppt/slides/slide39.xml><?xml version="1.0" encoding="utf-8"?>
-<p:sld xmlns:a="http://schemas.openxmlformats.org/drawingml/2006/main" xmlns:r="http://schemas.openxmlformats.org/officeDocument/2006/relationships" xmlns:p="http://schemas.openxmlformats.org/presentationml/2006/main">
-  <p:cSld>
-    <p:spTree>
-      <p:nvGrpSpPr>
-        <p:cNvPr id="1" name=""/>
-        <p:cNvGrpSpPr/>
-        <p:nvPr/>
-      </p:nvGrpSpPr>
-      <p:grpSpPr>
-        <a:xfrm>
-          <a:off x="0" y="0"/>
-          <a:ext cx="0" cy="0"/>
-          <a:chOff x="0" y="0"/>
-          <a:chExt cx="0" cy="0"/>
-        </a:xfrm>
-      </p:grpSpPr>
-      <p:sp>
-        <p:nvSpPr>
-          <p:cNvPr id="2" name="Title 1">
-            <a:extLst>
-              <a:ext uri="{FF2B5EF4-FFF2-40B4-BE49-F238E27FC236}">
-                <a16:creationId xmlns:a16="http://schemas.microsoft.com/office/drawing/2014/main" id="{7F5CD355-0B6A-4ED3-93F5-802B5D5D5AE6}"/>
-              </a:ext>
-            </a:extLst>
-          </p:cNvPr>
-          <p:cNvSpPr>
-            <a:spLocks noGrp="1"/>
-          </p:cNvSpPr>
-          <p:nvPr>
-            <p:ph type="title"/>
-          </p:nvPr>
-        </p:nvSpPr>
-        <p:spPr/>
-        <p:txBody>
-          <a:bodyPr/>
-          <a:lstStyle/>
-          <a:p>
-            <a:r>
-              <a:rPr lang="en-AU" dirty="0"/>
-              <a:t>Will - executor</a:t>
-            </a:r>
-          </a:p>
-        </p:txBody>
-      </p:sp>
-      <p:sp>
-        <p:nvSpPr>
-          <p:cNvPr id="3" name="Content Placeholder 2">
-            <a:extLst>
-              <a:ext uri="{FF2B5EF4-FFF2-40B4-BE49-F238E27FC236}">
-                <a16:creationId xmlns:a16="http://schemas.microsoft.com/office/drawing/2014/main" id="{8F87A3BB-4F12-4FEB-B7D2-BA2CC372E9C6}"/>
-              </a:ext>
-            </a:extLst>
-          </p:cNvPr>
-          <p:cNvSpPr>
-            <a:spLocks noGrp="1"/>
-          </p:cNvSpPr>
-          <p:nvPr>
-            <p:ph idx="1"/>
-          </p:nvPr>
-        </p:nvSpPr>
-        <p:spPr>
-          <a:xfrm>
-            <a:off x="1261872" y="1828800"/>
-            <a:ext cx="8595360" cy="4735002"/>
-          </a:xfrm>
-        </p:spPr>
-        <p:txBody>
-          <a:bodyPr>
-            <a:normAutofit/>
-          </a:bodyPr>
-          <a:lstStyle/>
-          <a:p>
-            <a:pPr lvl="0"/>
-            <a:r>
-              <a:rPr lang="en-US" dirty="0"/>
-              <a:t>Role</a:t>
-            </a:r>
-          </a:p>
-          <a:p>
-            <a:pPr lvl="1"/>
-            <a:r>
-              <a:rPr lang="en-US" dirty="0"/>
-              <a:t>Jointly</a:t>
-            </a:r>
-          </a:p>
-          <a:p>
-            <a:pPr lvl="1"/>
-            <a:r>
-              <a:rPr lang="en-US" dirty="0"/>
-              <a:t>Maximum four</a:t>
-            </a:r>
-          </a:p>
-          <a:p>
-            <a:pPr lvl="1"/>
-            <a:r>
-              <a:rPr lang="en-US" dirty="0"/>
-              <a:t>Abuse if one goes rogue</a:t>
-            </a:r>
-          </a:p>
-          <a:p>
-            <a:pPr lvl="1"/>
-            <a:r>
-              <a:rPr lang="en-US" dirty="0"/>
-              <a:t>Charging clauses</a:t>
-            </a:r>
-          </a:p>
-          <a:p>
-            <a:pPr lvl="0"/>
-            <a:r>
-              <a:rPr lang="en-US" dirty="0"/>
-              <a:t>Initial:</a:t>
-            </a:r>
-          </a:p>
-          <a:p>
-            <a:pPr lvl="0"/>
-            <a:endParaRPr lang="en-US" dirty="0"/>
-          </a:p>
-          <a:p>
-            <a:pPr lvl="0"/>
-            <a:r>
-              <a:rPr lang="en-US" dirty="0"/>
-              <a:t>Backup:</a:t>
-            </a:r>
-          </a:p>
-          <a:p>
-            <a:endParaRPr lang="en-AU" dirty="0"/>
-          </a:p>
-        </p:txBody>
-      </p:sp>
-    </p:spTree>
-    <p:extLst>
-      <p:ext uri="{BB962C8B-B14F-4D97-AF65-F5344CB8AC3E}">
-        <p14:creationId xmlns:p14="http://schemas.microsoft.com/office/powerpoint/2010/main" val="3465541232"/>
-      </p:ext>
-    </p:extLst>
-  </p:cSld>
-  <p:clrMapOvr>
-    <a:masterClrMapping/>
-  </p:clrMapOvr>
-</p:sld>
-</file>
-
 <file path=ppt/slides/slide4.xml><?xml version="1.0" encoding="utf-8"?>
 <p:sld xmlns:a="http://schemas.openxmlformats.org/drawingml/2006/main" xmlns:r="http://schemas.openxmlformats.org/officeDocument/2006/relationships" xmlns:p="http://schemas.openxmlformats.org/presentationml/2006/main">
   <p:cSld>
@@ -11122,72 +11257,27 @@
             <p:ph type="title"/>
           </p:nvPr>
         </p:nvSpPr>
-        <p:spPr/>
-        <p:txBody>
-          <a:bodyPr/>
-          <a:lstStyle/>
-          <a:p>
-            <a:r>
-              <a:rPr lang="en-AU" dirty="0"/>
-              <a:t>Will – guardian (if required)</a:t>
-            </a:r>
-          </a:p>
-        </p:txBody>
-      </p:sp>
-      <p:sp>
-        <p:nvSpPr>
-          <p:cNvPr id="3" name="Content Placeholder 2">
-            <a:extLst>
-              <a:ext uri="{FF2B5EF4-FFF2-40B4-BE49-F238E27FC236}">
-                <a16:creationId xmlns:a16="http://schemas.microsoft.com/office/drawing/2014/main" id="{8F87A3BB-4F12-4FEB-B7D2-BA2CC372E9C6}"/>
-              </a:ext>
-            </a:extLst>
-          </p:cNvPr>
-          <p:cNvSpPr>
-            <a:spLocks noGrp="1"/>
-          </p:cNvSpPr>
-          <p:nvPr>
-            <p:ph idx="1"/>
-          </p:nvPr>
-        </p:nvSpPr>
         <p:spPr>
           <a:xfrm>
-            <a:off x="1261872" y="1828800"/>
-            <a:ext cx="8595360" cy="4735002"/>
+            <a:off x="1428926" y="2272468"/>
+            <a:ext cx="9692640" cy="1397124"/>
           </a:xfrm>
         </p:spPr>
         <p:txBody>
-          <a:bodyPr>
-            <a:normAutofit/>
-          </a:bodyPr>
-          <a:lstStyle/>
-          <a:p>
-            <a:pPr lvl="0"/>
-            <a:r>
-              <a:rPr lang="en-US" dirty="0"/>
-              <a:t>Initial:</a:t>
-            </a:r>
-          </a:p>
-          <a:p>
-            <a:pPr lvl="0"/>
-            <a:endParaRPr lang="en-US" dirty="0"/>
-          </a:p>
-          <a:p>
-            <a:pPr lvl="0"/>
-            <a:r>
-              <a:rPr lang="en-US" dirty="0"/>
-              <a:t>Backup:</a:t>
-            </a:r>
-          </a:p>
-          <a:p>
-            <a:endParaRPr lang="en-AU" dirty="0"/>
+          <a:bodyPr/>
+          <a:lstStyle/>
+          <a:p>
+            <a:r>
+              <a:rPr lang="en-AU" dirty="0"/>
+              <a:t>Your estate plan and our advice</a:t>
+            </a:r>
           </a:p>
         </p:txBody>
       </p:sp>
     </p:spTree>
     <p:extLst>
       <p:ext uri="{BB962C8B-B14F-4D97-AF65-F5344CB8AC3E}">
-        <p14:creationId xmlns:p14="http://schemas.microsoft.com/office/powerpoint/2010/main" val="984565663"/>
+        <p14:creationId xmlns:p14="http://schemas.microsoft.com/office/powerpoint/2010/main" val="3018810443"/>
       </p:ext>
     </p:extLst>
   </p:cSld>
@@ -11237,7 +11327,7 @@
           <a:p>
             <a:r>
               <a:rPr lang="en-AU" dirty="0"/>
-              <a:t>Will – specific gifts</a:t>
+              <a:t>Personal assets - Will</a:t>
             </a:r>
           </a:p>
         </p:txBody>
@@ -11270,73 +11360,70 @@
           </a:bodyPr>
           <a:lstStyle/>
           <a:p>
-            <a:r>
-              <a:rPr lang="en-AU" dirty="0"/>
-              <a:t>Given unencumbered or encumbered?</a:t>
-            </a:r>
-          </a:p>
-          <a:p>
-            <a:r>
-              <a:rPr lang="en-AU" dirty="0"/>
-              <a:t>Given with any income it produces/without any income it produces?</a:t>
-            </a:r>
-          </a:p>
-          <a:p>
-            <a:r>
-              <a:rPr lang="en-AU" dirty="0"/>
-              <a:t>Backup persons?</a:t>
-            </a:r>
-          </a:p>
-          <a:p>
-            <a:r>
-              <a:rPr lang="en-AU" dirty="0"/>
-              <a:t>Delayed distribution (e.g. child doesn’t receive until certain age)</a:t>
-            </a:r>
-          </a:p>
-          <a:p>
-            <a:r>
-              <a:rPr lang="en-AU" dirty="0"/>
-              <a:t>Charities:</a:t>
-            </a:r>
-          </a:p>
-          <a:p>
-            <a:pPr lvl="1"/>
-            <a:r>
-              <a:rPr lang="en-AU" dirty="0"/>
-              <a:t>name them</a:t>
-            </a:r>
-          </a:p>
-          <a:p>
-            <a:pPr lvl="1"/>
-            <a:r>
-              <a:rPr lang="en-AU" dirty="0"/>
-              <a:t>at discretion of executors</a:t>
-            </a:r>
-          </a:p>
-          <a:p>
-            <a:r>
-              <a:rPr lang="en-AU" dirty="0"/>
-              <a:t>Insufficient funds</a:t>
-            </a:r>
-          </a:p>
-          <a:p>
-            <a:r>
-              <a:rPr lang="en-AU" dirty="0"/>
-              <a:t>In-specie tax consequences</a:t>
-            </a:r>
-          </a:p>
-          <a:p>
-            <a:r>
-              <a:rPr lang="en-AU" dirty="0"/>
-              <a:t>Life interest and right to occupy (complexity)</a:t>
-            </a:r>
+            <a:pPr lvl="0"/>
+            <a:r>
+              <a:rPr lang="en-US" dirty="0"/>
+              <a:t>Contemplation of marriage or divorce?</a:t>
+            </a:r>
+          </a:p>
+          <a:p>
+            <a:pPr lvl="0"/>
+            <a:r>
+              <a:rPr lang="en-US" dirty="0"/>
+              <a:t>Only governs Australian assets and revokes Australian Wills</a:t>
+            </a:r>
+          </a:p>
+          <a:p>
+            <a:pPr lvl="0"/>
+            <a:r>
+              <a:rPr lang="en-US" dirty="0"/>
+              <a:t>Testamentary trust used?</a:t>
+            </a:r>
+          </a:p>
+          <a:p>
+            <a:pPr lvl="0"/>
+            <a:r>
+              <a:rPr lang="en-US" dirty="0"/>
+              <a:t>Executor?</a:t>
+            </a:r>
+          </a:p>
+          <a:p>
+            <a:pPr lvl="0"/>
+            <a:r>
+              <a:rPr lang="en-US" dirty="0"/>
+              <a:t>Guardians?</a:t>
+            </a:r>
+          </a:p>
+          <a:p>
+            <a:pPr lvl="0"/>
+            <a:r>
+              <a:rPr lang="en-US" dirty="0"/>
+              <a:t>Specific gifts?</a:t>
+            </a:r>
+          </a:p>
+          <a:p>
+            <a:pPr lvl="0"/>
+            <a:r>
+              <a:rPr lang="en-US" dirty="0"/>
+              <a:t>Personal Property*?</a:t>
+            </a:r>
+          </a:p>
+          <a:p>
+            <a:pPr lvl="0"/>
+            <a:r>
+              <a:rPr lang="en-US" dirty="0"/>
+              <a:t>Everything else?</a:t>
+            </a:r>
+          </a:p>
+          <a:p>
+            <a:endParaRPr lang="en-AU" dirty="0"/>
           </a:p>
         </p:txBody>
       </p:sp>
     </p:spTree>
     <p:extLst>
       <p:ext uri="{BB962C8B-B14F-4D97-AF65-F5344CB8AC3E}">
-        <p14:creationId xmlns:p14="http://schemas.microsoft.com/office/powerpoint/2010/main" val="653968457"/>
+        <p14:creationId xmlns:p14="http://schemas.microsoft.com/office/powerpoint/2010/main" val="3724005480"/>
       </p:ext>
     </p:extLst>
   </p:cSld>
@@ -11386,7 +11473,7 @@
           <a:p>
             <a:r>
               <a:rPr lang="en-AU" dirty="0"/>
-              <a:t>Will – specific gifts</a:t>
+              <a:t>Will - executor</a:t>
             </a:r>
           </a:p>
         </p:txBody>
@@ -11419,9 +11506,59 @@
           </a:bodyPr>
           <a:lstStyle/>
           <a:p>
-            <a:pPr marL="0" indent="0">
-              <a:buNone/>
-            </a:pPr>
+            <a:pPr lvl="0"/>
+            <a:r>
+              <a:rPr lang="en-US" dirty="0"/>
+              <a:t>Role</a:t>
+            </a:r>
+          </a:p>
+          <a:p>
+            <a:pPr lvl="1"/>
+            <a:r>
+              <a:rPr lang="en-US" dirty="0"/>
+              <a:t>Jointly</a:t>
+            </a:r>
+          </a:p>
+          <a:p>
+            <a:pPr lvl="1"/>
+            <a:r>
+              <a:rPr lang="en-US" dirty="0"/>
+              <a:t>Maximum four</a:t>
+            </a:r>
+          </a:p>
+          <a:p>
+            <a:pPr lvl="1"/>
+            <a:r>
+              <a:rPr lang="en-US" dirty="0"/>
+              <a:t>Abuse if one goes rogue</a:t>
+            </a:r>
+          </a:p>
+          <a:p>
+            <a:pPr lvl="1"/>
+            <a:r>
+              <a:rPr lang="en-US" dirty="0"/>
+              <a:t>Charging clauses</a:t>
+            </a:r>
+          </a:p>
+          <a:p>
+            <a:pPr lvl="0"/>
+            <a:r>
+              <a:rPr lang="en-US" dirty="0"/>
+              <a:t>Initial:</a:t>
+            </a:r>
+          </a:p>
+          <a:p>
+            <a:pPr lvl="0"/>
+            <a:endParaRPr lang="en-US" dirty="0"/>
+          </a:p>
+          <a:p>
+            <a:pPr lvl="0"/>
+            <a:r>
+              <a:rPr lang="en-US" dirty="0"/>
+              <a:t>Backup:</a:t>
+            </a:r>
+          </a:p>
+          <a:p>
             <a:endParaRPr lang="en-AU" dirty="0"/>
           </a:p>
         </p:txBody>
@@ -11429,7 +11566,7 @@
     </p:spTree>
     <p:extLst>
       <p:ext uri="{BB962C8B-B14F-4D97-AF65-F5344CB8AC3E}">
-        <p14:creationId xmlns:p14="http://schemas.microsoft.com/office/powerpoint/2010/main" val="4135658150"/>
+        <p14:creationId xmlns:p14="http://schemas.microsoft.com/office/powerpoint/2010/main" val="3465541232"/>
       </p:ext>
     </p:extLst>
   </p:cSld>
@@ -11479,7 +11616,7 @@
           <a:p>
             <a:r>
               <a:rPr lang="en-AU" dirty="0"/>
-              <a:t>Will – Personal Property*</a:t>
+              <a:t>Will – guardian (if required)</a:t>
             </a:r>
           </a:p>
         </p:txBody>
@@ -11512,12 +11649,21 @@
           </a:bodyPr>
           <a:lstStyle/>
           <a:p>
-            <a:pPr marL="0" indent="0">
-              <a:buNone/>
-            </a:pPr>
-            <a:r>
-              <a:rPr lang="en-AU" dirty="0"/>
-              <a:t>Separately deal with common household items so that they do not need to be divided equally between multiple people. These assets are also directed towards individuals rather than other entities (such as testamentary trusts)</a:t>
+            <a:pPr lvl="0"/>
+            <a:r>
+              <a:rPr lang="en-US" dirty="0"/>
+              <a:t>Initial:</a:t>
+            </a:r>
+          </a:p>
+          <a:p>
+            <a:pPr lvl="0"/>
+            <a:endParaRPr lang="en-US" dirty="0"/>
+          </a:p>
+          <a:p>
+            <a:pPr lvl="0"/>
+            <a:r>
+              <a:rPr lang="en-US" dirty="0"/>
+              <a:t>Backup:</a:t>
             </a:r>
           </a:p>
           <a:p>
@@ -11528,7 +11674,7 @@
     </p:spTree>
     <p:extLst>
       <p:ext uri="{BB962C8B-B14F-4D97-AF65-F5344CB8AC3E}">
-        <p14:creationId xmlns:p14="http://schemas.microsoft.com/office/powerpoint/2010/main" val="2560883450"/>
+        <p14:creationId xmlns:p14="http://schemas.microsoft.com/office/powerpoint/2010/main" val="984565663"/>
       </p:ext>
     </p:extLst>
   </p:cSld>
@@ -11578,7 +11724,7 @@
           <a:p>
             <a:r>
               <a:rPr lang="en-AU" dirty="0"/>
-              <a:t>Will – everything else</a:t>
+              <a:t>Will – specific gifts</a:t>
             </a:r>
           </a:p>
         </p:txBody>
@@ -11611,14 +11757,73 @@
           </a:bodyPr>
           <a:lstStyle/>
           <a:p>
-            <a:endParaRPr lang="en-AU" dirty="0"/>
+            <a:r>
+              <a:rPr lang="en-AU" dirty="0"/>
+              <a:t>Given unencumbered or encumbered?</a:t>
+            </a:r>
+          </a:p>
+          <a:p>
+            <a:r>
+              <a:rPr lang="en-AU" dirty="0"/>
+              <a:t>Given with any income it produces/without any income it produces?</a:t>
+            </a:r>
+          </a:p>
+          <a:p>
+            <a:r>
+              <a:rPr lang="en-AU" dirty="0"/>
+              <a:t>Backup persons?</a:t>
+            </a:r>
+          </a:p>
+          <a:p>
+            <a:r>
+              <a:rPr lang="en-AU" dirty="0"/>
+              <a:t>Delayed distribution (e.g. child doesn’t receive until certain age)</a:t>
+            </a:r>
+          </a:p>
+          <a:p>
+            <a:r>
+              <a:rPr lang="en-AU" dirty="0"/>
+              <a:t>Charities:</a:t>
+            </a:r>
+          </a:p>
+          <a:p>
+            <a:pPr lvl="1"/>
+            <a:r>
+              <a:rPr lang="en-AU" dirty="0"/>
+              <a:t>name them</a:t>
+            </a:r>
+          </a:p>
+          <a:p>
+            <a:pPr lvl="1"/>
+            <a:r>
+              <a:rPr lang="en-AU" dirty="0"/>
+              <a:t>at discretion of executors</a:t>
+            </a:r>
+          </a:p>
+          <a:p>
+            <a:r>
+              <a:rPr lang="en-AU" dirty="0"/>
+              <a:t>Insufficient funds</a:t>
+            </a:r>
+          </a:p>
+          <a:p>
+            <a:r>
+              <a:rPr lang="en-AU" dirty="0"/>
+              <a:t>In-specie tax consequences</a:t>
+            </a:r>
+          </a:p>
+          <a:p>
+            <a:r>
+              <a:rPr lang="en-AU" dirty="0"/>
+              <a:t>Life interest and right to occupy (complexity)</a:t>
+            </a:r>
           </a:p>
         </p:txBody>
       </p:sp>
     </p:spTree>
     <p:extLst>
       <p:ext uri="{BB962C8B-B14F-4D97-AF65-F5344CB8AC3E}">
-        <p14:creationId xmlns:p14="http://schemas.microsoft.com/office/powerpoint/2010/main" val="838922079"/>
+        <p14:creationId xmlns:p14="http://schemas.microsoft.com/office/powerpoint/2010/main" val="653968457"/>
       </p:ext>
     </p:extLst>
   </p:cSld>
@@ -11668,7 +11873,7 @@
           <a:p>
             <a:r>
               <a:rPr lang="en-AU" dirty="0"/>
-              <a:t>Will – testamentary trust</a:t>
+              <a:t>Will – specific gifts</a:t>
             </a:r>
           </a:p>
         </p:txBody>
@@ -11701,74 +11906,9 @@
           </a:bodyPr>
           <a:lstStyle/>
           <a:p>
-            <a:pPr lvl="0"/>
-            <a:r>
-              <a:rPr lang="en-US" dirty="0"/>
-              <a:t>How many?</a:t>
-            </a:r>
-          </a:p>
-          <a:p>
-            <a:pPr lvl="0"/>
-            <a:r>
-              <a:rPr lang="en-US" dirty="0"/>
-              <a:t>Primary beneficiary?</a:t>
-            </a:r>
-          </a:p>
-          <a:p>
-            <a:pPr lvl="0"/>
-            <a:r>
-              <a:rPr lang="en-US" dirty="0"/>
-              <a:t>Beneficiaries – default is bloodline for the primary beneficiary</a:t>
-            </a:r>
-          </a:p>
-          <a:p>
-            <a:pPr lvl="0"/>
-            <a:r>
-              <a:rPr lang="en-US" dirty="0"/>
-              <a:t>Trustee?</a:t>
-            </a:r>
-          </a:p>
-          <a:p>
-            <a:pPr lvl="1"/>
-            <a:r>
-              <a:rPr lang="en-US" dirty="0"/>
-              <a:t>Executor or someone else?</a:t>
-            </a:r>
-          </a:p>
-          <a:p>
-            <a:pPr lvl="0"/>
-            <a:r>
-              <a:rPr lang="en-US" dirty="0"/>
-              <a:t>Appointor?</a:t>
-            </a:r>
-          </a:p>
-          <a:p>
-            <a:pPr lvl="1"/>
-            <a:r>
-              <a:rPr lang="en-US" dirty="0"/>
-              <a:t>Executor or someone else?</a:t>
-            </a:r>
-          </a:p>
-          <a:p>
-            <a:pPr lvl="1"/>
-            <a:r>
-              <a:rPr lang="en-US" dirty="0"/>
-              <a:t>Suggest align Trustee and Appointor initially?</a:t>
-            </a:r>
-          </a:p>
-          <a:p>
-            <a:r>
-              <a:rPr lang="en-US" dirty="0"/>
-              <a:t>Special rules (if memo of directions not enough)?</a:t>
-            </a:r>
-          </a:p>
-          <a:p>
-            <a:r>
-              <a:rPr lang="en-US" dirty="0"/>
-              <a:t>Standard terms otherwise provided to allow for flexibility of future tax planning</a:t>
-            </a:r>
-          </a:p>
-          <a:p>
+            <a:pPr marL="0" indent="0">
+              <a:buNone/>
+            </a:pPr>
             <a:endParaRPr lang="en-AU" dirty="0"/>
           </a:p>
         </p:txBody>
@@ -11776,7 +11916,7 @@
     </p:spTree>
     <p:extLst>
       <p:ext uri="{BB962C8B-B14F-4D97-AF65-F5344CB8AC3E}">
-        <p14:creationId xmlns:p14="http://schemas.microsoft.com/office/powerpoint/2010/main" val="1111827602"/>
+        <p14:creationId xmlns:p14="http://schemas.microsoft.com/office/powerpoint/2010/main" val="4135658150"/>
       </p:ext>
     </p:extLst>
   </p:cSld>
@@ -11826,7 +11966,7 @@
           <a:p>
             <a:r>
               <a:rPr lang="en-AU" dirty="0"/>
-              <a:t>Enduring power of attorney</a:t>
+              <a:t>Will – Personal Property*</a:t>
             </a:r>
           </a:p>
         </p:txBody>
@@ -11859,59 +11999,23 @@
           </a:bodyPr>
           <a:lstStyle/>
           <a:p>
-            <a:pPr lvl="0"/>
-            <a:r>
-              <a:rPr lang="en-US" dirty="0"/>
-              <a:t>Applicable while living</a:t>
-            </a:r>
-          </a:p>
-          <a:p>
-            <a:pPr lvl="0"/>
-            <a:r>
-              <a:rPr lang="en-US" dirty="0"/>
-              <a:t>Allows people to make financial and personal/health decision on your behalf</a:t>
-            </a:r>
-          </a:p>
-          <a:p>
-            <a:pPr lvl="0"/>
-            <a:r>
-              <a:rPr lang="en-US" dirty="0"/>
-              <a:t>Doesn’t deal with serious health issues – advance health directive</a:t>
-            </a:r>
-          </a:p>
-          <a:p>
-            <a:pPr lvl="0"/>
-            <a:r>
-              <a:rPr lang="en-US" dirty="0"/>
-              <a:t>Allows you to provide comments about your personal views and wants that your attorney needs to consider</a:t>
-            </a:r>
-          </a:p>
-          <a:p>
-            <a:pPr lvl="0"/>
-            <a:r>
-              <a:rPr lang="en-US" dirty="0"/>
-              <a:t>Otherwise, our practice is to allow your attorney the maximum flexibility required to make decisions on your behalf on the basis </a:t>
-            </a:r>
-            <a:r>
-              <a:rPr lang="en-US" u="sng" dirty="0"/>
-              <a:t>your attorney is required to notify and provide updates to certain people</a:t>
-            </a:r>
-            <a:endParaRPr lang="en-AU" u="sng" dirty="0"/>
-          </a:p>
-          <a:p>
-            <a:pPr lvl="0"/>
+            <a:pPr marL="0" indent="0">
+              <a:buNone/>
+            </a:pPr>
             <a:r>
               <a:rPr lang="en-AU" dirty="0"/>
-              <a:t>We will provide EPA explanatory guide with some takeaway information today for you</a:t>
-            </a:r>
-            <a:endParaRPr lang="en-US" dirty="0"/>
+              <a:t>Separately deal with common household items so that they do not need to be divided equally between multiple people. These assets are also directed towards individuals rather than other entities (such as testamentary trusts)</a:t>
+            </a:r>
+          </a:p>
+          <a:p>
+            <a:endParaRPr lang="en-AU" dirty="0"/>
           </a:p>
         </p:txBody>
       </p:sp>
     </p:spTree>
     <p:extLst>
       <p:ext uri="{BB962C8B-B14F-4D97-AF65-F5344CB8AC3E}">
-        <p14:creationId xmlns:p14="http://schemas.microsoft.com/office/powerpoint/2010/main" val="1063817574"/>
+        <p14:creationId xmlns:p14="http://schemas.microsoft.com/office/powerpoint/2010/main" val="2560883450"/>
       </p:ext>
     </p:extLst>
   </p:cSld>
@@ -11961,7 +12065,7 @@
           <a:p>
             <a:r>
               <a:rPr lang="en-AU" dirty="0"/>
-              <a:t>Enduring power of attorney</a:t>
+              <a:t>Will – everything else</a:t>
             </a:r>
           </a:p>
         </p:txBody>
@@ -11990,63 +12094,9 @@
         </p:spPr>
         <p:txBody>
           <a:bodyPr>
-            <a:normAutofit fontScale="92500" lnSpcReduction="20000"/>
+            <a:normAutofit/>
           </a:bodyPr>
           <a:lstStyle/>
-          <a:p>
-            <a:pPr lvl="0"/>
-            <a:r>
-              <a:rPr lang="en-US" dirty="0"/>
-              <a:t>Regarding financial decisions – your attorney can do any financial transaction you can do (bank account, home, investments). Duties exist, however, specific power can be given to financial attorney:</a:t>
-            </a:r>
-          </a:p>
-          <a:p>
-            <a:pPr lvl="1"/>
-            <a:r>
-              <a:rPr lang="en-US" dirty="0"/>
-              <a:t>Allowing them to enter into conflict transactions</a:t>
-            </a:r>
-          </a:p>
-          <a:p>
-            <a:pPr lvl="1"/>
-            <a:r>
-              <a:rPr lang="en-US" dirty="0"/>
-              <a:t>Allowing them to make gifts on your behalf</a:t>
-            </a:r>
-          </a:p>
-          <a:p>
-            <a:pPr lvl="1"/>
-            <a:r>
-              <a:rPr lang="en-US" dirty="0"/>
-              <a:t>Allowing them to update your superannuation nominations</a:t>
-            </a:r>
-          </a:p>
-          <a:p>
-            <a:r>
-              <a:rPr lang="en-US" dirty="0"/>
-              <a:t>Regarding personal/health decisions – your attorney can choose where you live and what you do</a:t>
-            </a:r>
-          </a:p>
-          <a:p>
-            <a:r>
-              <a:rPr lang="en-US" dirty="0"/>
-              <a:t>Our practice is to require your attorney to notify people before commencing the exercise of their power. Further, they must notify certain people on the following basis:</a:t>
-            </a:r>
-          </a:p>
-          <a:p>
-            <a:pPr lvl="1"/>
-            <a:r>
-              <a:rPr lang="en-US" dirty="0"/>
-              <a:t>For financial matters – provide 2 updates a year and retain significant records of their dealings on your behalf* (we also allow your attorney to charge professional fees given this onus to account formally)</a:t>
-            </a:r>
-          </a:p>
-          <a:p>
-            <a:pPr lvl="1"/>
-            <a:r>
-              <a:rPr lang="en-US" dirty="0"/>
-              <a:t>For personal matters – if they are changing the people you can interact, where you live or if you are undertaking a procedure that would ordinarily require consent forms to be signed</a:t>
-            </a:r>
-          </a:p>
           <a:p>
             <a:endParaRPr lang="en-AU" dirty="0"/>
           </a:p>
@@ -12055,7 +12105,7 @@
     </p:spTree>
     <p:extLst>
       <p:ext uri="{BB962C8B-B14F-4D97-AF65-F5344CB8AC3E}">
-        <p14:creationId xmlns:p14="http://schemas.microsoft.com/office/powerpoint/2010/main" val="1670491533"/>
+        <p14:creationId xmlns:p14="http://schemas.microsoft.com/office/powerpoint/2010/main" val="838922079"/>
       </p:ext>
     </p:extLst>
   </p:cSld>
@@ -12105,7 +12155,7 @@
           <a:p>
             <a:r>
               <a:rPr lang="en-AU" dirty="0"/>
-              <a:t>Enduring power of attorney</a:t>
+              <a:t>Will – testamentary trust</a:t>
             </a:r>
           </a:p>
         </p:txBody>
@@ -12141,68 +12191,71 @@
             <a:pPr lvl="0"/>
             <a:r>
               <a:rPr lang="en-US" dirty="0"/>
-              <a:t>Attorney duties:</a:t>
+              <a:t>How many?</a:t>
+            </a:r>
+          </a:p>
+          <a:p>
+            <a:pPr lvl="0"/>
+            <a:r>
+              <a:rPr lang="en-US" dirty="0"/>
+              <a:t>Primary beneficiary?</a:t>
+            </a:r>
+          </a:p>
+          <a:p>
+            <a:pPr lvl="0"/>
+            <a:r>
+              <a:rPr lang="en-US" dirty="0"/>
+              <a:t>Beneficiaries – default is bloodline for the primary beneficiary</a:t>
+            </a:r>
+          </a:p>
+          <a:p>
+            <a:pPr lvl="0"/>
+            <a:r>
+              <a:rPr lang="en-US" dirty="0"/>
+              <a:t>Trustee?</a:t>
             </a:r>
           </a:p>
           <a:p>
             <a:pPr lvl="1"/>
             <a:r>
               <a:rPr lang="en-US" dirty="0"/>
-              <a:t>Must apply general and health care principals prescribed under law (in short, requires your attorney to respect your rights)</a:t>
+              <a:t>Executor or someone else?</a:t>
+            </a:r>
+          </a:p>
+          <a:p>
+            <a:pPr lvl="0"/>
+            <a:r>
+              <a:rPr lang="en-US" dirty="0"/>
+              <a:t>Appointor?</a:t>
             </a:r>
           </a:p>
           <a:p>
             <a:pPr lvl="1"/>
             <a:r>
               <a:rPr lang="en-US" dirty="0"/>
-              <a:t>Must act honestly and with reasonable diligence in your best interest</a:t>
+              <a:t>Executor or someone else?</a:t>
             </a:r>
           </a:p>
           <a:p>
             <a:pPr lvl="1"/>
             <a:r>
               <a:rPr lang="en-US" dirty="0"/>
-              <a:t>Must consult with any other attorney appointed at the same time and ensure your interest is not negatively affected</a:t>
-            </a:r>
-          </a:p>
-          <a:p>
-            <a:pPr lvl="1"/>
-            <a:r>
-              <a:rPr lang="en-US" dirty="0"/>
-              <a:t>Must not inappropriately disclose confidential information</a:t>
-            </a:r>
-          </a:p>
-          <a:p>
-            <a:pPr lvl="1"/>
-            <a:r>
-              <a:rPr lang="en-US" dirty="0"/>
-              <a:t>Must invest in ‘authorised investments’, being investments that a prudent person would enter into or an investment approved by a tribunal</a:t>
-            </a:r>
-          </a:p>
-          <a:p>
-            <a:pPr lvl="1"/>
-            <a:r>
-              <a:rPr lang="en-US" dirty="0"/>
-              <a:t>Must keep accurate records and accounts of all dealings and transactions</a:t>
-            </a:r>
-          </a:p>
-          <a:p>
-            <a:pPr lvl="1"/>
-            <a:r>
-              <a:rPr lang="en-US" dirty="0"/>
-              <a:t>Must keep their property separate from your property</a:t>
-            </a:r>
-          </a:p>
-          <a:p>
-            <a:r>
-              <a:rPr lang="en-US" dirty="0"/>
-              <a:t>We provide some flexibility by allowing your attorney to make conflict transactions, however, those transactions must be made having taken the above duties into consideration</a:t>
-            </a:r>
-          </a:p>
-          <a:p>
-            <a:pPr marL="0" indent="0">
-              <a:buNone/>
-            </a:pPr>
+              <a:t>Suggest align Trustee and Appointor initially?</a:t>
+            </a:r>
+          </a:p>
+          <a:p>
+            <a:r>
+              <a:rPr lang="en-US" dirty="0"/>
+              <a:t>Special rules (if memo of directions not enough)?</a:t>
+            </a:r>
+          </a:p>
+          <a:p>
+            <a:r>
+              <a:rPr lang="en-US" dirty="0"/>
+              <a:t>Standard terms otherwise provided to allow for flexibility of future tax planning</a:t>
+            </a:r>
+          </a:p>
+          <a:p>
             <a:endParaRPr lang="en-AU" dirty="0"/>
           </a:p>
         </p:txBody>
@@ -12210,7 +12263,7 @@
     </p:spTree>
     <p:extLst>
       <p:ext uri="{BB962C8B-B14F-4D97-AF65-F5344CB8AC3E}">
-        <p14:creationId xmlns:p14="http://schemas.microsoft.com/office/powerpoint/2010/main" val="3715274592"/>
+        <p14:creationId xmlns:p14="http://schemas.microsoft.com/office/powerpoint/2010/main" val="1111827602"/>
       </p:ext>
     </p:extLst>
   </p:cSld>
@@ -12253,14 +12306,19 @@
             <p:ph type="title"/>
           </p:nvPr>
         </p:nvSpPr>
-        <p:spPr/>
+        <p:spPr>
+          <a:xfrm>
+            <a:off x="1249680" y="294198"/>
+            <a:ext cx="9692640" cy="1397124"/>
+          </a:xfrm>
+        </p:spPr>
         <p:txBody>
           <a:bodyPr/>
           <a:lstStyle/>
           <a:p>
             <a:r>
               <a:rPr lang="en-AU" dirty="0"/>
-              <a:t>Enduring power of attorney – who?</a:t>
+              <a:t>Enduring power of attorney</a:t>
             </a:r>
           </a:p>
         </p:txBody>
@@ -12289,56 +12347,71 @@
         </p:spPr>
         <p:txBody>
           <a:bodyPr>
-            <a:normAutofit/>
+            <a:normAutofit lnSpcReduction="10000"/>
           </a:bodyPr>
           <a:lstStyle/>
           <a:p>
             <a:pPr lvl="0"/>
             <a:r>
               <a:rPr lang="en-US" dirty="0"/>
-              <a:t>Someone you trust</a:t>
-            </a:r>
-          </a:p>
-          <a:p>
-            <a:pPr lvl="0"/>
-            <a:r>
-              <a:rPr lang="en-US" dirty="0"/>
-              <a:t>Someone able to follow the duties as required and account accordingly</a:t>
-            </a:r>
-          </a:p>
-          <a:p>
-            <a:pPr lvl="0"/>
-            <a:r>
-              <a:rPr lang="en-US" dirty="0"/>
-              <a:t>Breaching the attorney duties could result in criminal liability, paying compensation and accounting for profits</a:t>
-            </a:r>
-          </a:p>
-          <a:p>
-            <a:pPr lvl="0"/>
-            <a:r>
-              <a:rPr lang="en-US" dirty="0"/>
-              <a:t>Can appoint multiple people at one time</a:t>
-            </a:r>
-          </a:p>
-          <a:p>
-            <a:pPr lvl="0"/>
-            <a:r>
-              <a:rPr lang="en-US" dirty="0"/>
-              <a:t>Consider if jointly (maximum 4 can act jointly), severally, by majority or some other combination (for example, 2 out of 4)</a:t>
-            </a:r>
-          </a:p>
-          <a:p>
-            <a:pPr marL="0" indent="0">
-              <a:buNone/>
-            </a:pPr>
-            <a:endParaRPr lang="en-AU" dirty="0"/>
+              <a:t>Applicable while living</a:t>
+            </a:r>
+          </a:p>
+          <a:p>
+            <a:pPr lvl="0"/>
+            <a:r>
+              <a:rPr lang="en-US" dirty="0"/>
+              <a:t>Allows people to make financial (either immediately or only </a:t>
+            </a:r>
+            <a:r>
+              <a:rPr lang="en-US" dirty="0" err="1"/>
+              <a:t>onloss</a:t>
+            </a:r>
+            <a:r>
+              <a:rPr lang="en-US" dirty="0"/>
+              <a:t> of capacity) and personal/health decision (only on loss of capacity) on your behalf</a:t>
+            </a:r>
+          </a:p>
+          <a:p>
+            <a:pPr lvl="0"/>
+            <a:r>
+              <a:rPr lang="en-US" dirty="0"/>
+              <a:t>Doesn’t deal with serious health issues – advance health directive</a:t>
+            </a:r>
+          </a:p>
+          <a:p>
+            <a:pPr lvl="0"/>
+            <a:r>
+              <a:rPr lang="en-US" dirty="0"/>
+              <a:t>Allows you to provide comments about your personal views and wants that your attorney needs to consider</a:t>
+            </a:r>
+          </a:p>
+          <a:p>
+            <a:pPr lvl="0"/>
+            <a:r>
+              <a:rPr lang="en-US" dirty="0"/>
+              <a:t>Otherwise, our practice is to allow your attorney the maximum flexibility required to make decisions on your behalf on the basis </a:t>
+            </a:r>
+            <a:r>
+              <a:rPr lang="en-US" u="sng" dirty="0"/>
+              <a:t>your attorney is required to notify and provide updates to certain people</a:t>
+            </a:r>
+            <a:endParaRPr lang="en-AU" u="sng" dirty="0"/>
+          </a:p>
+          <a:p>
+            <a:pPr lvl="0"/>
+            <a:r>
+              <a:rPr lang="en-AU" dirty="0"/>
+              <a:t>We will provide EPA explanatory guide with some takeaway information today for you</a:t>
+            </a:r>
+            <a:endParaRPr lang="en-US" dirty="0"/>
           </a:p>
         </p:txBody>
       </p:sp>
     </p:spTree>
     <p:extLst>
       <p:ext uri="{BB962C8B-B14F-4D97-AF65-F5344CB8AC3E}">
-        <p14:creationId xmlns:p14="http://schemas.microsoft.com/office/powerpoint/2010/main" val="2458548712"/>
+        <p14:creationId xmlns:p14="http://schemas.microsoft.com/office/powerpoint/2010/main" val="1063817574"/>
       </p:ext>
     </p:extLst>
   </p:cSld>
@@ -12554,7 +12627,7 @@
           <a:p>
             <a:r>
               <a:rPr lang="en-AU" dirty="0"/>
-              <a:t>Enduring power of attorney – who?</a:t>
+              <a:t>Enduring power of attorney</a:t>
             </a:r>
           </a:p>
         </p:txBody>
@@ -12583,13 +12656,64 @@
         </p:spPr>
         <p:txBody>
           <a:bodyPr>
-            <a:normAutofit/>
+            <a:normAutofit fontScale="92500" lnSpcReduction="20000"/>
           </a:bodyPr>
           <a:lstStyle/>
           <a:p>
-            <a:pPr marL="0" indent="0">
-              <a:buNone/>
-            </a:pPr>
+            <a:pPr lvl="0"/>
+            <a:r>
+              <a:rPr lang="en-US" dirty="0"/>
+              <a:t>Regarding financial decisions – your attorney can do any financial transaction you can do (bank account, home, investments). Duties exist, however, specific power can be given to financial attorney:</a:t>
+            </a:r>
+          </a:p>
+          <a:p>
+            <a:pPr lvl="1"/>
+            <a:r>
+              <a:rPr lang="en-US" dirty="0"/>
+              <a:t>Allowing them to enter into conflict transactions</a:t>
+            </a:r>
+          </a:p>
+          <a:p>
+            <a:pPr lvl="1"/>
+            <a:r>
+              <a:rPr lang="en-US" dirty="0"/>
+              <a:t>Allowing them to make gifts on your behalf</a:t>
+            </a:r>
+          </a:p>
+          <a:p>
+            <a:pPr lvl="1"/>
+            <a:r>
+              <a:rPr lang="en-US" dirty="0"/>
+              <a:t>Allowing them to update your superannuation nominations</a:t>
+            </a:r>
+          </a:p>
+          <a:p>
+            <a:r>
+              <a:rPr lang="en-US" dirty="0"/>
+              <a:t>Regarding personal/health decisions – your attorney can choose where you live and what you do</a:t>
+            </a:r>
+          </a:p>
+          <a:p>
+            <a:r>
+              <a:rPr lang="en-US" dirty="0"/>
+              <a:t>Our practice is to require your attorney to notify people before commencing the exercise of their power. Further, they must notify certain people on the following basis:</a:t>
+            </a:r>
+          </a:p>
+          <a:p>
+            <a:pPr lvl="1"/>
+            <a:r>
+              <a:rPr lang="en-US" dirty="0"/>
+              <a:t>For financial matters – provide 2 updates a year and retain significant records of their dealings on your behalf* (we also allow your attorney to charge professional fees given this onus to account formally)</a:t>
+            </a:r>
+          </a:p>
+          <a:p>
+            <a:pPr lvl="1"/>
+            <a:r>
+              <a:rPr lang="en-US" dirty="0"/>
+              <a:t>For personal matters – if they are changing the people you can interact, where you live or if you are undertaking a procedure that would ordinarily require consent forms to be signed</a:t>
+            </a:r>
+          </a:p>
+          <a:p>
             <a:endParaRPr lang="en-AU" dirty="0"/>
           </a:p>
         </p:txBody>
@@ -12597,7 +12721,7 @@
     </p:spTree>
     <p:extLst>
       <p:ext uri="{BB962C8B-B14F-4D97-AF65-F5344CB8AC3E}">
-        <p14:creationId xmlns:p14="http://schemas.microsoft.com/office/powerpoint/2010/main" val="2652939454"/>
+        <p14:creationId xmlns:p14="http://schemas.microsoft.com/office/powerpoint/2010/main" val="1670491533"/>
       </p:ext>
     </p:extLst>
   </p:cSld>
@@ -12647,7 +12771,7 @@
           <a:p>
             <a:r>
               <a:rPr lang="en-AU" dirty="0"/>
-              <a:t>Advice in relation to other assets</a:t>
+              <a:t>Enduring power of attorney</a:t>
             </a:r>
           </a:p>
         </p:txBody>
@@ -12680,139 +12804,65 @@
           </a:bodyPr>
           <a:lstStyle/>
           <a:p>
-            <a:pPr marL="457200" lvl="0" indent="-393700" algn="l" rtl="0">
-              <a:spcBef>
-                <a:spcPts val="600"/>
-              </a:spcBef>
-              <a:spcAft>
-                <a:spcPts val="0"/>
-              </a:spcAft>
-              <a:buSzPts val="2600"/>
-            </a:pPr>
-            <a:r>
-              <a:rPr lang="en-AU" dirty="0"/>
-              <a:t>Superannuation</a:t>
-            </a:r>
-          </a:p>
-          <a:p>
-            <a:pPr marL="457200" lvl="0" indent="-393700" algn="l" rtl="0">
-              <a:spcBef>
-                <a:spcPts val="600"/>
-              </a:spcBef>
-              <a:spcAft>
-                <a:spcPts val="0"/>
-              </a:spcAft>
-              <a:buSzPts val="2600"/>
-            </a:pPr>
-            <a:r>
-              <a:rPr lang="en-AU" dirty="0"/>
-              <a:t>Joint assets</a:t>
-            </a:r>
-          </a:p>
-          <a:p>
-            <a:pPr marL="457200" lvl="0" indent="-393700" algn="l" rtl="0">
-              <a:spcBef>
-                <a:spcPts val="600"/>
-              </a:spcBef>
-              <a:spcAft>
-                <a:spcPts val="0"/>
-              </a:spcAft>
-              <a:buSzPts val="2600"/>
-            </a:pPr>
-            <a:r>
-              <a:rPr lang="en-AU" dirty="0"/>
-              <a:t>Trusts</a:t>
-            </a:r>
-          </a:p>
-          <a:p>
-            <a:pPr marL="457200" lvl="0" indent="-393700" algn="l" rtl="0">
-              <a:spcBef>
-                <a:spcPts val="600"/>
-              </a:spcBef>
-              <a:spcAft>
-                <a:spcPts val="0"/>
-              </a:spcAft>
-              <a:buSzPts val="2600"/>
-            </a:pPr>
-            <a:r>
-              <a:rPr lang="en-AU" dirty="0"/>
-              <a:t>Companies</a:t>
-            </a:r>
-          </a:p>
-          <a:p>
-            <a:pPr marL="457200" lvl="0" indent="-393700" algn="l" rtl="0">
-              <a:spcBef>
-                <a:spcPts val="600"/>
-              </a:spcBef>
-              <a:spcAft>
-                <a:spcPts val="0"/>
-              </a:spcAft>
-              <a:buSzPts val="2600"/>
-            </a:pPr>
-            <a:r>
-              <a:rPr lang="en-AU" dirty="0"/>
-              <a:t>Broader entity advice – financial statements, governing document review and entity power of attorney</a:t>
-            </a:r>
-          </a:p>
-          <a:p>
-            <a:pPr marL="457200" lvl="0" indent="-393700" algn="l" rtl="0">
-              <a:spcBef>
-                <a:spcPts val="600"/>
-              </a:spcBef>
-              <a:spcAft>
-                <a:spcPts val="0"/>
-              </a:spcAft>
-              <a:buSzPts val="2600"/>
-            </a:pPr>
-            <a:r>
-              <a:rPr lang="en-AU" dirty="0"/>
-              <a:t>Business/partnership assets</a:t>
-            </a:r>
-          </a:p>
-          <a:p>
-            <a:pPr marL="457200" lvl="0" indent="-393700" algn="l" rtl="0">
-              <a:spcBef>
-                <a:spcPts val="600"/>
-              </a:spcBef>
-              <a:spcAft>
-                <a:spcPts val="0"/>
-              </a:spcAft>
-              <a:buSzPts val="2600"/>
-            </a:pPr>
-            <a:r>
-              <a:rPr lang="en-AU" dirty="0"/>
-              <a:t>Overseas assets</a:t>
-            </a:r>
-          </a:p>
-          <a:p>
-            <a:pPr marL="457200" lvl="0" indent="-393700" algn="l" rtl="0">
-              <a:spcBef>
-                <a:spcPts val="600"/>
-              </a:spcBef>
-              <a:spcAft>
-                <a:spcPts val="0"/>
-              </a:spcAft>
-              <a:buSzPts val="2600"/>
-            </a:pPr>
-            <a:r>
-              <a:rPr lang="en-AU" dirty="0"/>
-              <a:t>Estate challenge strategies</a:t>
-            </a:r>
-          </a:p>
-          <a:p>
-            <a:pPr marL="63500" lvl="0" indent="0" algn="l" rtl="0">
-              <a:spcBef>
-                <a:spcPts val="600"/>
-              </a:spcBef>
-              <a:spcAft>
-                <a:spcPts val="0"/>
-              </a:spcAft>
-              <a:buSzPts val="2600"/>
-              <a:buNone/>
-            </a:pPr>
-            <a:r>
-              <a:rPr lang="en-AU" dirty="0"/>
-              <a:t>Recommendations documented via a ‘to-do’ list</a:t>
+            <a:pPr lvl="0"/>
+            <a:r>
+              <a:rPr lang="en-US" dirty="0"/>
+              <a:t>Attorney duties:</a:t>
+            </a:r>
+          </a:p>
+          <a:p>
+            <a:pPr lvl="1"/>
+            <a:r>
+              <a:rPr lang="en-US" dirty="0"/>
+              <a:t>Must apply general and health care principals prescribed under law (in short, requires your attorney to respect your rights)</a:t>
+            </a:r>
+          </a:p>
+          <a:p>
+            <a:pPr lvl="1"/>
+            <a:r>
+              <a:rPr lang="en-US" dirty="0"/>
+              <a:t>Must act honestly and with reasonable diligence in your best interest</a:t>
+            </a:r>
+          </a:p>
+          <a:p>
+            <a:pPr lvl="1"/>
+            <a:r>
+              <a:rPr lang="en-US" dirty="0"/>
+              <a:t>Must consult with any other attorney appointed at the same time and ensure your interest is not negatively affected</a:t>
+            </a:r>
+          </a:p>
+          <a:p>
+            <a:pPr lvl="1"/>
+            <a:r>
+              <a:rPr lang="en-US" dirty="0"/>
+              <a:t>Must not inappropriately disclose confidential information</a:t>
+            </a:r>
+          </a:p>
+          <a:p>
+            <a:pPr lvl="1"/>
+            <a:r>
+              <a:rPr lang="en-US" dirty="0"/>
+              <a:t>Must invest in ‘authorised investments’, being investments that a prudent person would enter into or an investment approved by a tribunal</a:t>
+            </a:r>
+          </a:p>
+          <a:p>
+            <a:pPr lvl="1"/>
+            <a:r>
+              <a:rPr lang="en-US" dirty="0"/>
+              <a:t>Must keep accurate records and accounts of all dealings and transactions</a:t>
+            </a:r>
+          </a:p>
+          <a:p>
+            <a:pPr lvl="1"/>
+            <a:r>
+              <a:rPr lang="en-US" dirty="0"/>
+              <a:t>Must keep their property separate from your property</a:t>
+            </a:r>
+          </a:p>
+          <a:p>
+            <a:r>
+              <a:rPr lang="en-US" dirty="0"/>
+              <a:t>We provide some flexibility by allowing your attorney to make conflict transactions, however, those transactions must be made having taken the above duties into consideration</a:t>
             </a:r>
           </a:p>
           <a:p>
@@ -12826,7 +12876,7 @@
     </p:spTree>
     <p:extLst>
       <p:ext uri="{BB962C8B-B14F-4D97-AF65-F5344CB8AC3E}">
-        <p14:creationId xmlns:p14="http://schemas.microsoft.com/office/powerpoint/2010/main" val="1936081102"/>
+        <p14:creationId xmlns:p14="http://schemas.microsoft.com/office/powerpoint/2010/main" val="3715274592"/>
       </p:ext>
     </p:extLst>
   </p:cSld>
@@ -12876,7 +12926,7 @@
           <a:p>
             <a:r>
               <a:rPr lang="en-AU" dirty="0"/>
-              <a:t>When to update your arrangements</a:t>
+              <a:t>Enduring power of attorney – who?</a:t>
             </a:r>
           </a:p>
         </p:txBody>
@@ -12909,123 +12959,38 @@
           </a:bodyPr>
           <a:lstStyle/>
           <a:p>
-            <a:pPr marL="457200" lvl="0" indent="-393700" algn="l" rtl="0">
-              <a:spcBef>
-                <a:spcPts val="600"/>
-              </a:spcBef>
-              <a:spcAft>
-                <a:spcPts val="0"/>
-              </a:spcAft>
-              <a:buSzPts val="2600"/>
-            </a:pPr>
-            <a:r>
-              <a:rPr lang="en-AU" dirty="0"/>
-              <a:t>Change of name</a:t>
-            </a:r>
-          </a:p>
-          <a:p>
-            <a:pPr marL="457200" lvl="0" indent="-393700" algn="l" rtl="0">
-              <a:spcBef>
-                <a:spcPts val="600"/>
-              </a:spcBef>
-              <a:spcAft>
-                <a:spcPts val="0"/>
-              </a:spcAft>
-              <a:buSzPts val="2600"/>
-            </a:pPr>
-            <a:r>
-              <a:rPr lang="en-AU" dirty="0"/>
-              <a:t>Mentioned person(s) dying or suffering a disability</a:t>
-            </a:r>
-          </a:p>
-          <a:p>
-            <a:pPr marL="457200" lvl="0" indent="-393700" algn="l" rtl="0">
-              <a:spcBef>
-                <a:spcPts val="600"/>
-              </a:spcBef>
-              <a:spcAft>
-                <a:spcPts val="0"/>
-              </a:spcAft>
-              <a:buSzPts val="2600"/>
-            </a:pPr>
-            <a:r>
-              <a:rPr lang="en-AU" dirty="0"/>
-              <a:t>Changes in relationship status to anyone named in your estate planning documents</a:t>
-            </a:r>
-          </a:p>
-          <a:p>
-            <a:pPr marL="457200" lvl="0" indent="-393700" algn="l" rtl="0">
-              <a:spcBef>
-                <a:spcPts val="600"/>
-              </a:spcBef>
-              <a:spcAft>
-                <a:spcPts val="0"/>
-              </a:spcAft>
-              <a:buSzPts val="2600"/>
-            </a:pPr>
-            <a:r>
-              <a:rPr lang="en-AU" dirty="0"/>
-              <a:t>Changes to your personal circumstances with certain people (i.e. being estranged with people)</a:t>
-            </a:r>
-          </a:p>
-          <a:p>
-            <a:pPr marL="457200" lvl="0" indent="-393700" algn="l" rtl="0">
-              <a:spcBef>
-                <a:spcPts val="600"/>
-              </a:spcBef>
-              <a:spcAft>
-                <a:spcPts val="0"/>
-              </a:spcAft>
-              <a:buSzPts val="2600"/>
-            </a:pPr>
-            <a:r>
-              <a:rPr lang="en-AU" dirty="0"/>
-              <a:t>Wanting a mutual Will</a:t>
-            </a:r>
-          </a:p>
-          <a:p>
-            <a:pPr marL="457200" lvl="0" indent="-393700" algn="l" rtl="0">
-              <a:spcBef>
-                <a:spcPts val="600"/>
-              </a:spcBef>
-              <a:spcAft>
-                <a:spcPts val="0"/>
-              </a:spcAft>
-              <a:buSzPts val="2600"/>
-            </a:pPr>
-            <a:r>
-              <a:rPr lang="en-AU" dirty="0"/>
-              <a:t>If you would like changes to the structure or gifts under your Will</a:t>
-            </a:r>
-          </a:p>
-          <a:p>
-            <a:pPr marL="457200" lvl="0" indent="-393700" algn="l" rtl="0">
-              <a:spcBef>
-                <a:spcPts val="600"/>
-              </a:spcBef>
-              <a:spcAft>
-                <a:spcPts val="0"/>
-              </a:spcAft>
-              <a:buSzPts val="2600"/>
-            </a:pPr>
-            <a:r>
-              <a:rPr lang="en-AU" dirty="0"/>
-              <a:t>Buying property jointly with others and not understanding what happens to the property on your passing</a:t>
-            </a:r>
-          </a:p>
-          <a:p>
-            <a:pPr marL="457200" lvl="0" indent="-393700" algn="l" rtl="0">
-              <a:spcBef>
-                <a:spcPts val="600"/>
-              </a:spcBef>
-              <a:spcAft>
-                <a:spcPts val="0"/>
-              </a:spcAft>
-              <a:buSzPts val="2600"/>
-            </a:pPr>
-            <a:r>
-              <a:rPr lang="en-AU" dirty="0"/>
-              <a:t>Establishing new structures where you do not know how control passes</a:t>
+            <a:pPr lvl="0"/>
+            <a:r>
+              <a:rPr lang="en-US" dirty="0"/>
+              <a:t>Someone you trust</a:t>
+            </a:r>
+          </a:p>
+          <a:p>
+            <a:pPr lvl="0"/>
+            <a:r>
+              <a:rPr lang="en-US" dirty="0"/>
+              <a:t>Someone able to follow the duties as required and account accordingly</a:t>
+            </a:r>
+          </a:p>
+          <a:p>
+            <a:pPr lvl="0"/>
+            <a:r>
+              <a:rPr lang="en-US" dirty="0"/>
+              <a:t>Breaching the attorney duties could result in criminal liability, paying compensation and accounting for profits</a:t>
+            </a:r>
+          </a:p>
+          <a:p>
+            <a:pPr lvl="0"/>
+            <a:r>
+              <a:rPr lang="en-US" dirty="0"/>
+              <a:t>Can appoint multiple people at one time</a:t>
+            </a:r>
+          </a:p>
+          <a:p>
+            <a:pPr lvl="0"/>
+            <a:r>
+              <a:rPr lang="en-US" dirty="0"/>
+              <a:t>Consider if jointly (maximum 4 can act jointly), severally, by majority or some other combination (for example, 2 out of 4)</a:t>
             </a:r>
           </a:p>
           <a:p>
@@ -13039,7 +13004,7 @@
     </p:spTree>
     <p:extLst>
       <p:ext uri="{BB962C8B-B14F-4D97-AF65-F5344CB8AC3E}">
-        <p14:creationId xmlns:p14="http://schemas.microsoft.com/office/powerpoint/2010/main" val="674075688"/>
+        <p14:creationId xmlns:p14="http://schemas.microsoft.com/office/powerpoint/2010/main" val="2458548712"/>
       </p:ext>
     </p:extLst>
   </p:cSld>
@@ -13089,6 +13054,541 @@
           <a:p>
             <a:r>
               <a:rPr lang="en-AU" dirty="0"/>
+              <a:t>Enduring power of attorney – who?</a:t>
+            </a:r>
+          </a:p>
+        </p:txBody>
+      </p:sp>
+      <p:sp>
+        <p:nvSpPr>
+          <p:cNvPr id="3" name="Content Placeholder 2">
+            <a:extLst>
+              <a:ext uri="{FF2B5EF4-FFF2-40B4-BE49-F238E27FC236}">
+                <a16:creationId xmlns:a16="http://schemas.microsoft.com/office/drawing/2014/main" id="{8F87A3BB-4F12-4FEB-B7D2-BA2CC372E9C6}"/>
+              </a:ext>
+            </a:extLst>
+          </p:cNvPr>
+          <p:cNvSpPr>
+            <a:spLocks noGrp="1"/>
+          </p:cNvSpPr>
+          <p:nvPr>
+            <p:ph idx="1"/>
+          </p:nvPr>
+        </p:nvSpPr>
+        <p:spPr>
+          <a:xfrm>
+            <a:off x="1261872" y="1828800"/>
+            <a:ext cx="8595360" cy="4735002"/>
+          </a:xfrm>
+        </p:spPr>
+        <p:txBody>
+          <a:bodyPr>
+            <a:normAutofit/>
+          </a:bodyPr>
+          <a:lstStyle/>
+          <a:p>
+            <a:pPr marL="0" indent="0">
+              <a:buNone/>
+            </a:pPr>
+            <a:endParaRPr lang="en-AU" dirty="0"/>
+          </a:p>
+        </p:txBody>
+      </p:sp>
+    </p:spTree>
+    <p:extLst>
+      <p:ext uri="{BB962C8B-B14F-4D97-AF65-F5344CB8AC3E}">
+        <p14:creationId xmlns:p14="http://schemas.microsoft.com/office/powerpoint/2010/main" val="2652939454"/>
+      </p:ext>
+    </p:extLst>
+  </p:cSld>
+  <p:clrMapOvr>
+    <a:masterClrMapping/>
+  </p:clrMapOvr>
+</p:sld>
+</file>
+
+<file path=ppt/slides/slide54.xml><?xml version="1.0" encoding="utf-8"?>
+<p:sld xmlns:a="http://schemas.openxmlformats.org/drawingml/2006/main" xmlns:r="http://schemas.openxmlformats.org/officeDocument/2006/relationships" xmlns:p="http://schemas.openxmlformats.org/presentationml/2006/main">
+  <p:cSld>
+    <p:spTree>
+      <p:nvGrpSpPr>
+        <p:cNvPr id="1" name=""/>
+        <p:cNvGrpSpPr/>
+        <p:nvPr/>
+      </p:nvGrpSpPr>
+      <p:grpSpPr>
+        <a:xfrm>
+          <a:off x="0" y="0"/>
+          <a:ext cx="0" cy="0"/>
+          <a:chOff x="0" y="0"/>
+          <a:chExt cx="0" cy="0"/>
+        </a:xfrm>
+      </p:grpSpPr>
+      <p:sp>
+        <p:nvSpPr>
+          <p:cNvPr id="2" name="Title 1">
+            <a:extLst>
+              <a:ext uri="{FF2B5EF4-FFF2-40B4-BE49-F238E27FC236}">
+                <a16:creationId xmlns:a16="http://schemas.microsoft.com/office/drawing/2014/main" id="{7F5CD355-0B6A-4ED3-93F5-802B5D5D5AE6}"/>
+              </a:ext>
+            </a:extLst>
+          </p:cNvPr>
+          <p:cNvSpPr>
+            <a:spLocks noGrp="1"/>
+          </p:cNvSpPr>
+          <p:nvPr>
+            <p:ph type="title"/>
+          </p:nvPr>
+        </p:nvSpPr>
+        <p:spPr/>
+        <p:txBody>
+          <a:bodyPr/>
+          <a:lstStyle/>
+          <a:p>
+            <a:r>
+              <a:rPr lang="en-AU" dirty="0"/>
+              <a:t>Advice in relation to other assets</a:t>
+            </a:r>
+          </a:p>
+        </p:txBody>
+      </p:sp>
+      <p:sp>
+        <p:nvSpPr>
+          <p:cNvPr id="3" name="Content Placeholder 2">
+            <a:extLst>
+              <a:ext uri="{FF2B5EF4-FFF2-40B4-BE49-F238E27FC236}">
+                <a16:creationId xmlns:a16="http://schemas.microsoft.com/office/drawing/2014/main" id="{8F87A3BB-4F12-4FEB-B7D2-BA2CC372E9C6}"/>
+              </a:ext>
+            </a:extLst>
+          </p:cNvPr>
+          <p:cNvSpPr>
+            <a:spLocks noGrp="1"/>
+          </p:cNvSpPr>
+          <p:nvPr>
+            <p:ph idx="1"/>
+          </p:nvPr>
+        </p:nvSpPr>
+        <p:spPr>
+          <a:xfrm>
+            <a:off x="1261872" y="1828800"/>
+            <a:ext cx="8595360" cy="4735002"/>
+          </a:xfrm>
+        </p:spPr>
+        <p:txBody>
+          <a:bodyPr>
+            <a:normAutofit/>
+          </a:bodyPr>
+          <a:lstStyle/>
+          <a:p>
+            <a:pPr marL="457200" lvl="0" indent="-393700" algn="l" rtl="0">
+              <a:spcBef>
+                <a:spcPts val="600"/>
+              </a:spcBef>
+              <a:spcAft>
+                <a:spcPts val="0"/>
+              </a:spcAft>
+              <a:buSzPts val="2600"/>
+            </a:pPr>
+            <a:r>
+              <a:rPr lang="en-AU" dirty="0"/>
+              <a:t>Superannuation</a:t>
+            </a:r>
+          </a:p>
+          <a:p>
+            <a:pPr marL="457200" lvl="0" indent="-393700" algn="l" rtl="0">
+              <a:spcBef>
+                <a:spcPts val="600"/>
+              </a:spcBef>
+              <a:spcAft>
+                <a:spcPts val="0"/>
+              </a:spcAft>
+              <a:buSzPts val="2600"/>
+            </a:pPr>
+            <a:r>
+              <a:rPr lang="en-AU" dirty="0"/>
+              <a:t>Joint assets</a:t>
+            </a:r>
+          </a:p>
+          <a:p>
+            <a:pPr marL="457200" lvl="0" indent="-393700" algn="l" rtl="0">
+              <a:spcBef>
+                <a:spcPts val="600"/>
+              </a:spcBef>
+              <a:spcAft>
+                <a:spcPts val="0"/>
+              </a:spcAft>
+              <a:buSzPts val="2600"/>
+            </a:pPr>
+            <a:r>
+              <a:rPr lang="en-AU" dirty="0"/>
+              <a:t>Trusts</a:t>
+            </a:r>
+          </a:p>
+          <a:p>
+            <a:pPr marL="457200" lvl="0" indent="-393700" algn="l" rtl="0">
+              <a:spcBef>
+                <a:spcPts val="600"/>
+              </a:spcBef>
+              <a:spcAft>
+                <a:spcPts val="0"/>
+              </a:spcAft>
+              <a:buSzPts val="2600"/>
+            </a:pPr>
+            <a:r>
+              <a:rPr lang="en-AU" dirty="0"/>
+              <a:t>Companies</a:t>
+            </a:r>
+          </a:p>
+          <a:p>
+            <a:pPr marL="457200" lvl="0" indent="-393700" algn="l" rtl="0">
+              <a:spcBef>
+                <a:spcPts val="600"/>
+              </a:spcBef>
+              <a:spcAft>
+                <a:spcPts val="0"/>
+              </a:spcAft>
+              <a:buSzPts val="2600"/>
+            </a:pPr>
+            <a:r>
+              <a:rPr lang="en-AU" dirty="0"/>
+              <a:t>Broader entity advice – financial statements, governing document review and entity power of attorney</a:t>
+            </a:r>
+          </a:p>
+          <a:p>
+            <a:pPr marL="457200" lvl="0" indent="-393700" algn="l" rtl="0">
+              <a:spcBef>
+                <a:spcPts val="600"/>
+              </a:spcBef>
+              <a:spcAft>
+                <a:spcPts val="0"/>
+              </a:spcAft>
+              <a:buSzPts val="2600"/>
+            </a:pPr>
+            <a:r>
+              <a:rPr lang="en-AU" dirty="0"/>
+              <a:t>Business/partnership assets</a:t>
+            </a:r>
+          </a:p>
+          <a:p>
+            <a:pPr marL="457200" lvl="0" indent="-393700" algn="l" rtl="0">
+              <a:spcBef>
+                <a:spcPts val="600"/>
+              </a:spcBef>
+              <a:spcAft>
+                <a:spcPts val="0"/>
+              </a:spcAft>
+              <a:buSzPts val="2600"/>
+            </a:pPr>
+            <a:r>
+              <a:rPr lang="en-AU" dirty="0"/>
+              <a:t>Overseas assets</a:t>
+            </a:r>
+          </a:p>
+          <a:p>
+            <a:pPr marL="457200" lvl="0" indent="-393700" algn="l" rtl="0">
+              <a:spcBef>
+                <a:spcPts val="600"/>
+              </a:spcBef>
+              <a:spcAft>
+                <a:spcPts val="0"/>
+              </a:spcAft>
+              <a:buSzPts val="2600"/>
+            </a:pPr>
+            <a:r>
+              <a:rPr lang="en-AU" dirty="0"/>
+              <a:t>Estate challenge strategies</a:t>
+            </a:r>
+          </a:p>
+          <a:p>
+            <a:pPr marL="63500" lvl="0" indent="0" algn="l" rtl="0">
+              <a:spcBef>
+                <a:spcPts val="600"/>
+              </a:spcBef>
+              <a:spcAft>
+                <a:spcPts val="0"/>
+              </a:spcAft>
+              <a:buSzPts val="2600"/>
+              <a:buNone/>
+            </a:pPr>
+            <a:r>
+              <a:rPr lang="en-AU" dirty="0"/>
+              <a:t>Recommendations documented via a ‘to-do’ list</a:t>
+            </a:r>
+          </a:p>
+          <a:p>
+            <a:pPr marL="0" indent="0">
+              <a:buNone/>
+            </a:pPr>
+            <a:endParaRPr lang="en-AU" dirty="0"/>
+          </a:p>
+        </p:txBody>
+      </p:sp>
+    </p:spTree>
+    <p:extLst>
+      <p:ext uri="{BB962C8B-B14F-4D97-AF65-F5344CB8AC3E}">
+        <p14:creationId xmlns:p14="http://schemas.microsoft.com/office/powerpoint/2010/main" val="1936081102"/>
+      </p:ext>
+    </p:extLst>
+  </p:cSld>
+  <p:clrMapOvr>
+    <a:masterClrMapping/>
+  </p:clrMapOvr>
+</p:sld>
+</file>
+
+<file path=ppt/slides/slide55.xml><?xml version="1.0" encoding="utf-8"?>
+<p:sld xmlns:a="http://schemas.openxmlformats.org/drawingml/2006/main" xmlns:r="http://schemas.openxmlformats.org/officeDocument/2006/relationships" xmlns:p="http://schemas.openxmlformats.org/presentationml/2006/main">
+  <p:cSld>
+    <p:spTree>
+      <p:nvGrpSpPr>
+        <p:cNvPr id="1" name=""/>
+        <p:cNvGrpSpPr/>
+        <p:nvPr/>
+      </p:nvGrpSpPr>
+      <p:grpSpPr>
+        <a:xfrm>
+          <a:off x="0" y="0"/>
+          <a:ext cx="0" cy="0"/>
+          <a:chOff x="0" y="0"/>
+          <a:chExt cx="0" cy="0"/>
+        </a:xfrm>
+      </p:grpSpPr>
+      <p:sp>
+        <p:nvSpPr>
+          <p:cNvPr id="2" name="Title 1">
+            <a:extLst>
+              <a:ext uri="{FF2B5EF4-FFF2-40B4-BE49-F238E27FC236}">
+                <a16:creationId xmlns:a16="http://schemas.microsoft.com/office/drawing/2014/main" id="{7F5CD355-0B6A-4ED3-93F5-802B5D5D5AE6}"/>
+              </a:ext>
+            </a:extLst>
+          </p:cNvPr>
+          <p:cNvSpPr>
+            <a:spLocks noGrp="1"/>
+          </p:cNvSpPr>
+          <p:nvPr>
+            <p:ph type="title"/>
+          </p:nvPr>
+        </p:nvSpPr>
+        <p:spPr/>
+        <p:txBody>
+          <a:bodyPr/>
+          <a:lstStyle/>
+          <a:p>
+            <a:r>
+              <a:rPr lang="en-AU" dirty="0"/>
+              <a:t>When to update your arrangements</a:t>
+            </a:r>
+          </a:p>
+        </p:txBody>
+      </p:sp>
+      <p:sp>
+        <p:nvSpPr>
+          <p:cNvPr id="3" name="Content Placeholder 2">
+            <a:extLst>
+              <a:ext uri="{FF2B5EF4-FFF2-40B4-BE49-F238E27FC236}">
+                <a16:creationId xmlns:a16="http://schemas.microsoft.com/office/drawing/2014/main" id="{8F87A3BB-4F12-4FEB-B7D2-BA2CC372E9C6}"/>
+              </a:ext>
+            </a:extLst>
+          </p:cNvPr>
+          <p:cNvSpPr>
+            <a:spLocks noGrp="1"/>
+          </p:cNvSpPr>
+          <p:nvPr>
+            <p:ph idx="1"/>
+          </p:nvPr>
+        </p:nvSpPr>
+        <p:spPr>
+          <a:xfrm>
+            <a:off x="1261872" y="1828800"/>
+            <a:ext cx="8595360" cy="4735002"/>
+          </a:xfrm>
+        </p:spPr>
+        <p:txBody>
+          <a:bodyPr>
+            <a:normAutofit/>
+          </a:bodyPr>
+          <a:lstStyle/>
+          <a:p>
+            <a:pPr marL="457200" lvl="0" indent="-393700" algn="l" rtl="0">
+              <a:spcBef>
+                <a:spcPts val="600"/>
+              </a:spcBef>
+              <a:spcAft>
+                <a:spcPts val="0"/>
+              </a:spcAft>
+              <a:buSzPts val="2600"/>
+            </a:pPr>
+            <a:r>
+              <a:rPr lang="en-AU" dirty="0"/>
+              <a:t>Change of name</a:t>
+            </a:r>
+          </a:p>
+          <a:p>
+            <a:pPr marL="457200" lvl="0" indent="-393700" algn="l" rtl="0">
+              <a:spcBef>
+                <a:spcPts val="600"/>
+              </a:spcBef>
+              <a:spcAft>
+                <a:spcPts val="0"/>
+              </a:spcAft>
+              <a:buSzPts val="2600"/>
+            </a:pPr>
+            <a:r>
+              <a:rPr lang="en-AU" dirty="0"/>
+              <a:t>Mentioned person(s) dying or suffering a disability</a:t>
+            </a:r>
+          </a:p>
+          <a:p>
+            <a:pPr marL="457200" lvl="0" indent="-393700" algn="l" rtl="0">
+              <a:spcBef>
+                <a:spcPts val="600"/>
+              </a:spcBef>
+              <a:spcAft>
+                <a:spcPts val="0"/>
+              </a:spcAft>
+              <a:buSzPts val="2600"/>
+            </a:pPr>
+            <a:r>
+              <a:rPr lang="en-AU" dirty="0"/>
+              <a:t>Changes in relationship status to anyone named in your estate planning documents</a:t>
+            </a:r>
+          </a:p>
+          <a:p>
+            <a:pPr marL="457200" lvl="0" indent="-393700" algn="l" rtl="0">
+              <a:spcBef>
+                <a:spcPts val="600"/>
+              </a:spcBef>
+              <a:spcAft>
+                <a:spcPts val="0"/>
+              </a:spcAft>
+              <a:buSzPts val="2600"/>
+            </a:pPr>
+            <a:r>
+              <a:rPr lang="en-AU" dirty="0"/>
+              <a:t>Changes to your personal circumstances with certain people (i.e. being estranged with people)</a:t>
+            </a:r>
+          </a:p>
+          <a:p>
+            <a:pPr marL="457200" lvl="0" indent="-393700" algn="l" rtl="0">
+              <a:spcBef>
+                <a:spcPts val="600"/>
+              </a:spcBef>
+              <a:spcAft>
+                <a:spcPts val="0"/>
+              </a:spcAft>
+              <a:buSzPts val="2600"/>
+            </a:pPr>
+            <a:r>
+              <a:rPr lang="en-AU" dirty="0"/>
+              <a:t>Wanting a mutual Will</a:t>
+            </a:r>
+          </a:p>
+          <a:p>
+            <a:pPr marL="457200" lvl="0" indent="-393700" algn="l" rtl="0">
+              <a:spcBef>
+                <a:spcPts val="600"/>
+              </a:spcBef>
+              <a:spcAft>
+                <a:spcPts val="0"/>
+              </a:spcAft>
+              <a:buSzPts val="2600"/>
+            </a:pPr>
+            <a:r>
+              <a:rPr lang="en-AU" dirty="0"/>
+              <a:t>If you would like changes to the structure or gifts under your Will</a:t>
+            </a:r>
+          </a:p>
+          <a:p>
+            <a:pPr marL="457200" lvl="0" indent="-393700" algn="l" rtl="0">
+              <a:spcBef>
+                <a:spcPts val="600"/>
+              </a:spcBef>
+              <a:spcAft>
+                <a:spcPts val="0"/>
+              </a:spcAft>
+              <a:buSzPts val="2600"/>
+            </a:pPr>
+            <a:r>
+              <a:rPr lang="en-AU" dirty="0"/>
+              <a:t>Buying property jointly with others and not understanding what happens to the property on your passing</a:t>
+            </a:r>
+          </a:p>
+          <a:p>
+            <a:pPr marL="457200" lvl="0" indent="-393700" algn="l" rtl="0">
+              <a:spcBef>
+                <a:spcPts val="600"/>
+              </a:spcBef>
+              <a:spcAft>
+                <a:spcPts val="0"/>
+              </a:spcAft>
+              <a:buSzPts val="2600"/>
+            </a:pPr>
+            <a:r>
+              <a:rPr lang="en-AU" dirty="0"/>
+              <a:t>Establishing new structures where you do not know how control passes</a:t>
+            </a:r>
+          </a:p>
+          <a:p>
+            <a:pPr marL="0" indent="0">
+              <a:buNone/>
+            </a:pPr>
+            <a:endParaRPr lang="en-AU" dirty="0"/>
+          </a:p>
+        </p:txBody>
+      </p:sp>
+    </p:spTree>
+    <p:extLst>
+      <p:ext uri="{BB962C8B-B14F-4D97-AF65-F5344CB8AC3E}">
+        <p14:creationId xmlns:p14="http://schemas.microsoft.com/office/powerpoint/2010/main" val="674075688"/>
+      </p:ext>
+    </p:extLst>
+  </p:cSld>
+  <p:clrMapOvr>
+    <a:masterClrMapping/>
+  </p:clrMapOvr>
+</p:sld>
+</file>
+
+<file path=ppt/slides/slide56.xml><?xml version="1.0" encoding="utf-8"?>
+<p:sld xmlns:a="http://schemas.openxmlformats.org/drawingml/2006/main" xmlns:r="http://schemas.openxmlformats.org/officeDocument/2006/relationships" xmlns:p="http://schemas.openxmlformats.org/presentationml/2006/main">
+  <p:cSld>
+    <p:spTree>
+      <p:nvGrpSpPr>
+        <p:cNvPr id="1" name=""/>
+        <p:cNvGrpSpPr/>
+        <p:nvPr/>
+      </p:nvGrpSpPr>
+      <p:grpSpPr>
+        <a:xfrm>
+          <a:off x="0" y="0"/>
+          <a:ext cx="0" cy="0"/>
+          <a:chOff x="0" y="0"/>
+          <a:chExt cx="0" cy="0"/>
+        </a:xfrm>
+      </p:grpSpPr>
+      <p:sp>
+        <p:nvSpPr>
+          <p:cNvPr id="2" name="Title 1">
+            <a:extLst>
+              <a:ext uri="{FF2B5EF4-FFF2-40B4-BE49-F238E27FC236}">
+                <a16:creationId xmlns:a16="http://schemas.microsoft.com/office/drawing/2014/main" id="{7F5CD355-0B6A-4ED3-93F5-802B5D5D5AE6}"/>
+              </a:ext>
+            </a:extLst>
+          </p:cNvPr>
+          <p:cNvSpPr>
+            <a:spLocks noGrp="1"/>
+          </p:cNvSpPr>
+          <p:nvPr>
+            <p:ph type="title"/>
+          </p:nvPr>
+        </p:nvSpPr>
+        <p:spPr/>
+        <p:txBody>
+          <a:bodyPr/>
+          <a:lstStyle/>
+          <a:p>
+            <a:r>
+              <a:rPr lang="en-AU" dirty="0"/>
               <a:t>Next steps</a:t>
             </a:r>
           </a:p>
@@ -13184,7 +13684,7 @@
 </p:sld>
 </file>
 
-<file path=ppt/slides/slide54.xml><?xml version="1.0" encoding="utf-8"?>
+<file path=ppt/slides/slide57.xml><?xml version="1.0" encoding="utf-8"?>
 <p:sld xmlns:a="http://schemas.openxmlformats.org/drawingml/2006/main" xmlns:r="http://schemas.openxmlformats.org/officeDocument/2006/relationships" xmlns:p="http://schemas.openxmlformats.org/presentationml/2006/main">
   <p:cSld>
     <p:spTree>

</xml_diff>